<commit_message>
update PP - HV
</commit_message>
<xml_diff>
--- a/PROJECT PRESENTATION.pptx
+++ b/PROJECT PRESENTATION.pptx
@@ -219,7 +219,7 @@
           <a:effectLst/>
           <a:extLst>
             <a:ext uri="{91240B29-F687-4f45-9708-019B960494DF}">
-              <a14:hiddenLine xmlns="" xmlns:a14="http://schemas.microsoft.com/office/drawing/2010/main" w="9525">
+              <a14:hiddenLine xmlns:a14="http://schemas.microsoft.com/office/drawing/2010/main" xmlns="" w="9525">
                 <a:solidFill>
                   <a:srgbClr val="000000"/>
                 </a:solidFill>
@@ -270,7 +270,7 @@
           </a:lstStyle>
           <a:p>
             <a:r>
-              <a:rPr lang="en-US" smtClean="0"/>
+              <a:rPr lang="en-US"/>
               <a:t>Click to edit Master title style</a:t>
             </a:r>
             <a:endParaRPr lang="en-US" dirty="0"/>
@@ -387,7 +387,7 @@
           </a:lstStyle>
           <a:p>
             <a:r>
-              <a:rPr lang="en-US" smtClean="0"/>
+              <a:rPr lang="en-US"/>
               <a:t>Click to edit Master subtitle style</a:t>
             </a:r>
             <a:endParaRPr lang="en-US" dirty="0"/>
@@ -412,7 +412,7 @@
             <a:fld id="{08B9EBBA-996F-894A-B54A-D6246ED52CEA}" type="datetimeFigureOut">
               <a:rPr lang="en-US" dirty="0"/>
               <a:pPr/>
-              <a:t>5/15/2020</a:t>
+              <a:t>5/16/2020</a:t>
             </a:fld>
             <a:endParaRPr lang="en-US" dirty="0"/>
           </a:p>
@@ -513,7 +513,7 @@
           </a:lstStyle>
           <a:p>
             <a:r>
-              <a:rPr lang="en-US" smtClean="0"/>
+              <a:rPr lang="en-US"/>
               <a:t>Click to edit Master title style</a:t>
             </a:r>
             <a:endParaRPr lang="en-US" dirty="0"/>
@@ -635,7 +635,7 @@
           </a:lstStyle>
           <a:p>
             <a:r>
-              <a:rPr lang="en-US" smtClean="0"/>
+              <a:rPr lang="en-US"/>
               <a:t>Click icon to add picture</a:t>
             </a:r>
             <a:endParaRPr lang="en-US" dirty="0"/>
@@ -703,7 +703,7 @@
           <a:p>
             <a:pPr lvl="0"/>
             <a:r>
-              <a:rPr lang="en-US" smtClean="0"/>
+              <a:rPr lang="en-US"/>
               <a:t>Click to edit Master text styles</a:t>
             </a:r>
           </a:p>
@@ -727,7 +727,7 @@
             <a:fld id="{18C79C5D-2A6F-F04D-97DA-BEF2467B64E4}" type="datetimeFigureOut">
               <a:rPr lang="en-US" dirty="0"/>
               <a:pPr/>
-              <a:t>5/15/2020</a:t>
+              <a:t>5/16/2020</a:t>
             </a:fld>
             <a:endParaRPr lang="en-US" dirty="0"/>
           </a:p>
@@ -1034,7 +1034,7 @@
           </a:lstStyle>
           <a:p>
             <a:r>
-              <a:rPr lang="en-US" smtClean="0"/>
+              <a:rPr lang="en-US"/>
               <a:t>Click to edit Master title style</a:t>
             </a:r>
             <a:endParaRPr lang="en-US" dirty="0"/>
@@ -1154,7 +1154,7 @@
           <a:p>
             <a:pPr lvl="0"/>
             <a:r>
-              <a:rPr lang="en-US" smtClean="0"/>
+              <a:rPr lang="en-US"/>
               <a:t>Click to edit Master text styles</a:t>
             </a:r>
           </a:p>
@@ -1188,7 +1188,7 @@
           <a:p>
             <a:pPr lvl="0"/>
             <a:r>
-              <a:rPr lang="en-US" smtClean="0"/>
+              <a:rPr lang="en-US"/>
               <a:t>Click to edit Master text styles</a:t>
             </a:r>
           </a:p>
@@ -1212,7 +1212,7 @@
             <a:fld id="{8DFA1846-DA80-1C48-A609-854EA85C59AD}" type="datetimeFigureOut">
               <a:rPr lang="en-US" dirty="0"/>
               <a:pPr/>
-              <a:t>5/15/2020</a:t>
+              <a:t>5/16/2020</a:t>
             </a:fld>
             <a:endParaRPr lang="en-US" dirty="0"/>
           </a:p>
@@ -1519,7 +1519,7 @@
           </a:lstStyle>
           <a:p>
             <a:r>
-              <a:rPr lang="en-US" smtClean="0"/>
+              <a:rPr lang="en-US"/>
               <a:t>Click to edit Master title style</a:t>
             </a:r>
             <a:endParaRPr lang="en-US" dirty="0"/>
@@ -1554,7 +1554,7 @@
           <a:p>
             <a:pPr lvl="0"/>
             <a:r>
-              <a:rPr lang="en-US" smtClean="0"/>
+              <a:rPr lang="en-US"/>
               <a:t>Click to edit Master text styles</a:t>
             </a:r>
           </a:p>
@@ -1578,7 +1578,7 @@
             <a:fld id="{FBF54567-0DE4-3F47-BF90-CB84690072F9}" type="datetimeFigureOut">
               <a:rPr lang="en-US" dirty="0"/>
               <a:pPr/>
-              <a:t>5/15/2020</a:t>
+              <a:t>5/16/2020</a:t>
             </a:fld>
             <a:endParaRPr lang="en-US" dirty="0"/>
           </a:p>
@@ -1729,7 +1729,7 @@
           <a:ln/>
           <a:extLst>
             <a:ext uri="{91240B29-F687-4f45-9708-019B960494DF}">
-              <a14:hiddenLine xmlns="" xmlns:a14="http://schemas.microsoft.com/office/drawing/2010/main" w="9525">
+              <a14:hiddenLine xmlns:a14="http://schemas.microsoft.com/office/drawing/2010/main" xmlns="" w="9525">
                 <a:solidFill>
                   <a:srgbClr val="000000"/>
                 </a:solidFill>
@@ -1771,7 +1771,7 @@
           <a:lstStyle/>
           <a:p>
             <a:r>
-              <a:rPr lang="en-US" smtClean="0"/>
+              <a:rPr lang="en-US"/>
               <a:t>Click to edit Master title style</a:t>
             </a:r>
             <a:endParaRPr lang="en-US" dirty="0"/>
@@ -1795,35 +1795,35 @@
           <a:p>
             <a:pPr lvl="0"/>
             <a:r>
-              <a:rPr lang="en-US" smtClean="0"/>
+              <a:rPr lang="en-US"/>
               <a:t>Click to edit Master text styles</a:t>
             </a:r>
           </a:p>
           <a:p>
             <a:pPr lvl="1"/>
             <a:r>
-              <a:rPr lang="en-US" smtClean="0"/>
+              <a:rPr lang="en-US"/>
               <a:t>Second level</a:t>
             </a:r>
           </a:p>
           <a:p>
             <a:pPr lvl="2"/>
             <a:r>
-              <a:rPr lang="en-US" smtClean="0"/>
+              <a:rPr lang="en-US"/>
               <a:t>Third level</a:t>
             </a:r>
           </a:p>
           <a:p>
             <a:pPr lvl="3"/>
             <a:r>
-              <a:rPr lang="en-US" smtClean="0"/>
+              <a:rPr lang="en-US"/>
               <a:t>Fourth level</a:t>
             </a:r>
           </a:p>
           <a:p>
             <a:pPr lvl="4"/>
             <a:r>
-              <a:rPr lang="en-US" smtClean="0"/>
+              <a:rPr lang="en-US"/>
               <a:t>Fifth level</a:t>
             </a:r>
             <a:endParaRPr lang="en-US" dirty="0"/>
@@ -1848,7 +1848,7 @@
             <a:fld id="{C6C52C72-DE31-F449-A4ED-4C594FD91407}" type="datetimeFigureOut">
               <a:rPr lang="en-US" dirty="0"/>
               <a:pPr/>
-              <a:t>5/15/2020</a:t>
+              <a:t>5/16/2020</a:t>
             </a:fld>
             <a:endParaRPr lang="en-US" dirty="0"/>
           </a:p>
@@ -2001,7 +2001,7 @@
           <a:ln/>
           <a:extLst>
             <a:ext uri="{91240B29-F687-4f45-9708-019B960494DF}">
-              <a14:hiddenLine xmlns="" xmlns:a14="http://schemas.microsoft.com/office/drawing/2010/main" w="9525">
+              <a14:hiddenLine xmlns:a14="http://schemas.microsoft.com/office/drawing/2010/main" xmlns="" w="9525">
                 <a:solidFill>
                   <a:srgbClr val="000000"/>
                 </a:solidFill>
@@ -2048,7 +2048,7 @@
           <a:lstStyle/>
           <a:p>
             <a:r>
-              <a:rPr lang="en-US" smtClean="0"/>
+              <a:rPr lang="en-US"/>
               <a:t>Click to edit Master title style</a:t>
             </a:r>
             <a:endParaRPr lang="en-US" dirty="0"/>
@@ -2077,35 +2077,35 @@
           <a:p>
             <a:pPr lvl="0"/>
             <a:r>
-              <a:rPr lang="en-US" smtClean="0"/>
+              <a:rPr lang="en-US"/>
               <a:t>Click to edit Master text styles</a:t>
             </a:r>
           </a:p>
           <a:p>
             <a:pPr lvl="1"/>
             <a:r>
-              <a:rPr lang="en-US" smtClean="0"/>
+              <a:rPr lang="en-US"/>
               <a:t>Second level</a:t>
             </a:r>
           </a:p>
           <a:p>
             <a:pPr lvl="2"/>
             <a:r>
-              <a:rPr lang="en-US" smtClean="0"/>
+              <a:rPr lang="en-US"/>
               <a:t>Third level</a:t>
             </a:r>
           </a:p>
           <a:p>
             <a:pPr lvl="3"/>
             <a:r>
-              <a:rPr lang="en-US" smtClean="0"/>
+              <a:rPr lang="en-US"/>
               <a:t>Fourth level</a:t>
             </a:r>
           </a:p>
           <a:p>
             <a:pPr lvl="4"/>
             <a:r>
-              <a:rPr lang="en-US" smtClean="0"/>
+              <a:rPr lang="en-US"/>
               <a:t>Fifth level</a:t>
             </a:r>
             <a:endParaRPr lang="en-US" dirty="0"/>
@@ -2130,7 +2130,7 @@
             <a:fld id="{ED62726E-379B-B349-9EED-81ED093FA806}" type="datetimeFigureOut">
               <a:rPr lang="en-US" dirty="0"/>
               <a:pPr/>
-              <a:t>5/15/2020</a:t>
+              <a:t>5/16/2020</a:t>
             </a:fld>
             <a:endParaRPr lang="en-US" dirty="0"/>
           </a:p>
@@ -2281,7 +2281,7 @@
           <a:ln/>
           <a:extLst>
             <a:ext uri="{91240B29-F687-4f45-9708-019B960494DF}">
-              <a14:hiddenLine xmlns="" xmlns:a14="http://schemas.microsoft.com/office/drawing/2010/main" w="9525">
+              <a14:hiddenLine xmlns:a14="http://schemas.microsoft.com/office/drawing/2010/main" xmlns="" w="9525">
                 <a:solidFill>
                   <a:srgbClr val="000000"/>
                 </a:solidFill>
@@ -2328,7 +2328,7 @@
           <a:lstStyle/>
           <a:p>
             <a:r>
-              <a:rPr lang="en-US" smtClean="0"/>
+              <a:rPr lang="en-US"/>
               <a:t>Click to edit Master title style</a:t>
             </a:r>
             <a:endParaRPr lang="en-US" dirty="0"/>
@@ -2357,35 +2357,35 @@
           <a:p>
             <a:pPr lvl="0"/>
             <a:r>
-              <a:rPr lang="en-US" smtClean="0"/>
+              <a:rPr lang="en-US"/>
               <a:t>Click to edit Master text styles</a:t>
             </a:r>
           </a:p>
           <a:p>
             <a:pPr lvl="1"/>
             <a:r>
-              <a:rPr lang="en-US" smtClean="0"/>
+              <a:rPr lang="en-US"/>
               <a:t>Second level</a:t>
             </a:r>
           </a:p>
           <a:p>
             <a:pPr lvl="2"/>
             <a:r>
-              <a:rPr lang="en-US" smtClean="0"/>
+              <a:rPr lang="en-US"/>
               <a:t>Third level</a:t>
             </a:r>
           </a:p>
           <a:p>
             <a:pPr lvl="3"/>
             <a:r>
-              <a:rPr lang="en-US" smtClean="0"/>
+              <a:rPr lang="en-US"/>
               <a:t>Fourth level</a:t>
             </a:r>
           </a:p>
           <a:p>
             <a:pPr lvl="4"/>
             <a:r>
-              <a:rPr lang="en-US" smtClean="0"/>
+              <a:rPr lang="en-US"/>
               <a:t>Fifth level</a:t>
             </a:r>
             <a:endParaRPr lang="en-US" dirty="0"/>
@@ -2410,7 +2410,7 @@
             <a:fld id="{9B3A1323-8D79-1946-B0D7-40001CF92E9D}" type="datetimeFigureOut">
               <a:rPr lang="en-US" dirty="0"/>
               <a:pPr/>
-              <a:t>5/15/2020</a:t>
+              <a:t>5/16/2020</a:t>
             </a:fld>
             <a:endParaRPr lang="en-US" dirty="0"/>
           </a:p>
@@ -2606,7 +2606,7 @@
           </a:lstStyle>
           <a:p>
             <a:r>
-              <a:rPr lang="en-US" smtClean="0"/>
+              <a:rPr lang="en-US"/>
               <a:t>Click to edit Master title style</a:t>
             </a:r>
             <a:endParaRPr lang="en-US" dirty="0"/>
@@ -2726,7 +2726,7 @@
           <a:p>
             <a:pPr lvl="0"/>
             <a:r>
-              <a:rPr lang="en-US" smtClean="0"/>
+              <a:rPr lang="en-US"/>
               <a:t>Click to edit Master text styles</a:t>
             </a:r>
           </a:p>
@@ -2750,7 +2750,7 @@
             <a:fld id="{8DFA1846-DA80-1C48-A609-854EA85C59AD}" type="datetimeFigureOut">
               <a:rPr lang="en-US" dirty="0"/>
               <a:pPr/>
-              <a:t>5/15/2020</a:t>
+              <a:t>5/16/2020</a:t>
             </a:fld>
             <a:endParaRPr lang="en-US" dirty="0"/>
           </a:p>
@@ -2901,7 +2901,7 @@
           <a:ln/>
           <a:extLst>
             <a:ext uri="{91240B29-F687-4f45-9708-019B960494DF}">
-              <a14:hiddenLine xmlns="" xmlns:a14="http://schemas.microsoft.com/office/drawing/2010/main" w="9525">
+              <a14:hiddenLine xmlns:a14="http://schemas.microsoft.com/office/drawing/2010/main" xmlns="" w="9525">
                 <a:solidFill>
                   <a:srgbClr val="000000"/>
                 </a:solidFill>
@@ -2943,7 +2943,7 @@
           <a:lstStyle/>
           <a:p>
             <a:r>
-              <a:rPr lang="en-US" smtClean="0"/>
+              <a:rPr lang="en-US"/>
               <a:t>Click to edit Master title style</a:t>
             </a:r>
             <a:endParaRPr lang="en-US" dirty="0"/>
@@ -2974,35 +2974,35 @@
           <a:p>
             <a:pPr lvl="0"/>
             <a:r>
-              <a:rPr lang="en-US" smtClean="0"/>
+              <a:rPr lang="en-US"/>
               <a:t>Click to edit Master text styles</a:t>
             </a:r>
           </a:p>
           <a:p>
             <a:pPr lvl="1"/>
             <a:r>
-              <a:rPr lang="en-US" smtClean="0"/>
+              <a:rPr lang="en-US"/>
               <a:t>Second level</a:t>
             </a:r>
           </a:p>
           <a:p>
             <a:pPr lvl="2"/>
             <a:r>
-              <a:rPr lang="en-US" smtClean="0"/>
+              <a:rPr lang="en-US"/>
               <a:t>Third level</a:t>
             </a:r>
           </a:p>
           <a:p>
             <a:pPr lvl="3"/>
             <a:r>
-              <a:rPr lang="en-US" smtClean="0"/>
+              <a:rPr lang="en-US"/>
               <a:t>Fourth level</a:t>
             </a:r>
           </a:p>
           <a:p>
             <a:pPr lvl="4"/>
             <a:r>
-              <a:rPr lang="en-US" smtClean="0"/>
+              <a:rPr lang="en-US"/>
               <a:t>Fifth level</a:t>
             </a:r>
             <a:endParaRPr lang="en-US" dirty="0"/>
@@ -3033,35 +3033,35 @@
           <a:p>
             <a:pPr lvl="0"/>
             <a:r>
-              <a:rPr lang="en-US" smtClean="0"/>
+              <a:rPr lang="en-US"/>
               <a:t>Click to edit Master text styles</a:t>
             </a:r>
           </a:p>
           <a:p>
             <a:pPr lvl="1"/>
             <a:r>
-              <a:rPr lang="en-US" smtClean="0"/>
+              <a:rPr lang="en-US"/>
               <a:t>Second level</a:t>
             </a:r>
           </a:p>
           <a:p>
             <a:pPr lvl="2"/>
             <a:r>
-              <a:rPr lang="en-US" smtClean="0"/>
+              <a:rPr lang="en-US"/>
               <a:t>Third level</a:t>
             </a:r>
           </a:p>
           <a:p>
             <a:pPr lvl="3"/>
             <a:r>
-              <a:rPr lang="en-US" smtClean="0"/>
+              <a:rPr lang="en-US"/>
               <a:t>Fourth level</a:t>
             </a:r>
           </a:p>
           <a:p>
             <a:pPr lvl="4"/>
             <a:r>
-              <a:rPr lang="en-US" smtClean="0"/>
+              <a:rPr lang="en-US"/>
               <a:t>Fifth level</a:t>
             </a:r>
             <a:endParaRPr lang="en-US" dirty="0"/>
@@ -3086,7 +3086,7 @@
             <a:fld id="{57302355-E14B-8545-A8F8-0FE83CC9D524}" type="datetimeFigureOut">
               <a:rPr lang="en-US" dirty="0"/>
               <a:pPr/>
-              <a:t>5/15/2020</a:t>
+              <a:t>5/16/2020</a:t>
             </a:fld>
             <a:endParaRPr lang="en-US" dirty="0"/>
           </a:p>
@@ -3237,7 +3237,7 @@
           <a:ln/>
           <a:extLst>
             <a:ext uri="{91240B29-F687-4f45-9708-019B960494DF}">
-              <a14:hiddenLine xmlns="" xmlns:a14="http://schemas.microsoft.com/office/drawing/2010/main" w="9525">
+              <a14:hiddenLine xmlns:a14="http://schemas.microsoft.com/office/drawing/2010/main" xmlns="" w="9525">
                 <a:solidFill>
                   <a:srgbClr val="000000"/>
                 </a:solidFill>
@@ -3283,7 +3283,7 @@
           </a:lstStyle>
           <a:p>
             <a:r>
-              <a:rPr lang="en-US" smtClean="0"/>
+              <a:rPr lang="en-US"/>
               <a:t>Click to edit Master title style</a:t>
             </a:r>
             <a:endParaRPr lang="en-US" dirty="0"/>
@@ -3351,7 +3351,7 @@
           <a:p>
             <a:pPr lvl="0"/>
             <a:r>
-              <a:rPr lang="en-US" smtClean="0"/>
+              <a:rPr lang="en-US"/>
               <a:t>Click to edit Master text styles</a:t>
             </a:r>
           </a:p>
@@ -3381,35 +3381,35 @@
           <a:p>
             <a:pPr lvl="0"/>
             <a:r>
-              <a:rPr lang="en-US" smtClean="0"/>
+              <a:rPr lang="en-US"/>
               <a:t>Click to edit Master text styles</a:t>
             </a:r>
           </a:p>
           <a:p>
             <a:pPr lvl="1"/>
             <a:r>
-              <a:rPr lang="en-US" smtClean="0"/>
+              <a:rPr lang="en-US"/>
               <a:t>Second level</a:t>
             </a:r>
           </a:p>
           <a:p>
             <a:pPr lvl="2"/>
             <a:r>
-              <a:rPr lang="en-US" smtClean="0"/>
+              <a:rPr lang="en-US"/>
               <a:t>Third level</a:t>
             </a:r>
           </a:p>
           <a:p>
             <a:pPr lvl="3"/>
             <a:r>
-              <a:rPr lang="en-US" smtClean="0"/>
+              <a:rPr lang="en-US"/>
               <a:t>Fourth level</a:t>
             </a:r>
           </a:p>
           <a:p>
             <a:pPr lvl="4"/>
             <a:r>
-              <a:rPr lang="en-US" smtClean="0"/>
+              <a:rPr lang="en-US"/>
               <a:t>Fifth level</a:t>
             </a:r>
             <a:endParaRPr lang="en-US" dirty="0"/>
@@ -3477,7 +3477,7 @@
           <a:p>
             <a:pPr lvl="0"/>
             <a:r>
-              <a:rPr lang="en-US" smtClean="0"/>
+              <a:rPr lang="en-US"/>
               <a:t>Click to edit Master text styles</a:t>
             </a:r>
           </a:p>
@@ -3507,35 +3507,35 @@
           <a:p>
             <a:pPr lvl="0"/>
             <a:r>
-              <a:rPr lang="en-US" smtClean="0"/>
+              <a:rPr lang="en-US"/>
               <a:t>Click to edit Master text styles</a:t>
             </a:r>
           </a:p>
           <a:p>
             <a:pPr lvl="1"/>
             <a:r>
-              <a:rPr lang="en-US" smtClean="0"/>
+              <a:rPr lang="en-US"/>
               <a:t>Second level</a:t>
             </a:r>
           </a:p>
           <a:p>
             <a:pPr lvl="2"/>
             <a:r>
-              <a:rPr lang="en-US" smtClean="0"/>
+              <a:rPr lang="en-US"/>
               <a:t>Third level</a:t>
             </a:r>
           </a:p>
           <a:p>
             <a:pPr lvl="3"/>
             <a:r>
-              <a:rPr lang="en-US" smtClean="0"/>
+              <a:rPr lang="en-US"/>
               <a:t>Fourth level</a:t>
             </a:r>
           </a:p>
           <a:p>
             <a:pPr lvl="4"/>
             <a:r>
-              <a:rPr lang="en-US" smtClean="0"/>
+              <a:rPr lang="en-US"/>
               <a:t>Fifth level</a:t>
             </a:r>
             <a:endParaRPr lang="en-US" dirty="0"/>
@@ -3560,7 +3560,7 @@
             <a:fld id="{02640F58-564D-2B4F-AE67-E407BA4FCF45}" type="datetimeFigureOut">
               <a:rPr lang="en-US" dirty="0"/>
               <a:pPr/>
-              <a:t>5/15/2020</a:t>
+              <a:t>5/16/2020</a:t>
             </a:fld>
             <a:endParaRPr lang="en-US" dirty="0"/>
           </a:p>
@@ -3711,7 +3711,7 @@
           <a:ln/>
           <a:extLst>
             <a:ext uri="{91240B29-F687-4f45-9708-019B960494DF}">
-              <a14:hiddenLine xmlns="" xmlns:a14="http://schemas.microsoft.com/office/drawing/2010/main" w="9525">
+              <a14:hiddenLine xmlns:a14="http://schemas.microsoft.com/office/drawing/2010/main" xmlns="" w="9525">
                 <a:solidFill>
                   <a:srgbClr val="000000"/>
                 </a:solidFill>
@@ -3753,7 +3753,7 @@
           <a:lstStyle/>
           <a:p>
             <a:r>
-              <a:rPr lang="en-US" smtClean="0"/>
+              <a:rPr lang="en-US"/>
               <a:t>Click to edit Master title style</a:t>
             </a:r>
             <a:endParaRPr lang="en-US" dirty="0"/>
@@ -3778,7 +3778,7 @@
             <a:fld id="{F13A34C8-038E-2045-AF43-DF7DBB8E0E9E}" type="datetimeFigureOut">
               <a:rPr lang="en-US" dirty="0"/>
               <a:pPr/>
-              <a:t>5/15/2020</a:t>
+              <a:t>5/16/2020</a:t>
             </a:fld>
             <a:endParaRPr lang="en-US" dirty="0"/>
           </a:p>
@@ -3870,7 +3870,7 @@
             <a:fld id="{8818C68F-D26B-8F47-958C-23B49CF8A634}" type="datetimeFigureOut">
               <a:rPr lang="en-US" dirty="0"/>
               <a:pPr/>
-              <a:t>5/15/2020</a:t>
+              <a:t>5/16/2020</a:t>
             </a:fld>
             <a:endParaRPr lang="en-US" dirty="0"/>
           </a:p>
@@ -4134,7 +4134,7 @@
           <a:ln/>
           <a:extLst>
             <a:ext uri="{91240B29-F687-4f45-9708-019B960494DF}">
-              <a14:hiddenLine xmlns="" xmlns:a14="http://schemas.microsoft.com/office/drawing/2010/main" w="9525">
+              <a14:hiddenLine xmlns:a14="http://schemas.microsoft.com/office/drawing/2010/main" xmlns="" w="9525">
                 <a:solidFill>
                   <a:srgbClr val="000000"/>
                 </a:solidFill>
@@ -4185,7 +4185,7 @@
           </a:lstStyle>
           <a:p>
             <a:r>
-              <a:rPr lang="en-US" smtClean="0"/>
+              <a:rPr lang="en-US"/>
               <a:t>Click to edit Master title style</a:t>
             </a:r>
             <a:endParaRPr lang="en-US" dirty="0"/>
@@ -4216,35 +4216,35 @@
           <a:p>
             <a:pPr lvl="0"/>
             <a:r>
-              <a:rPr lang="en-US" smtClean="0"/>
+              <a:rPr lang="en-US"/>
               <a:t>Click to edit Master text styles</a:t>
             </a:r>
           </a:p>
           <a:p>
             <a:pPr lvl="1"/>
             <a:r>
-              <a:rPr lang="en-US" smtClean="0"/>
+              <a:rPr lang="en-US"/>
               <a:t>Second level</a:t>
             </a:r>
           </a:p>
           <a:p>
             <a:pPr lvl="2"/>
             <a:r>
-              <a:rPr lang="en-US" smtClean="0"/>
+              <a:rPr lang="en-US"/>
               <a:t>Third level</a:t>
             </a:r>
           </a:p>
           <a:p>
             <a:pPr lvl="3"/>
             <a:r>
-              <a:rPr lang="en-US" smtClean="0"/>
+              <a:rPr lang="en-US"/>
               <a:t>Fourth level</a:t>
             </a:r>
           </a:p>
           <a:p>
             <a:pPr lvl="4"/>
             <a:r>
-              <a:rPr lang="en-US" smtClean="0"/>
+              <a:rPr lang="en-US"/>
               <a:t>Fifth level</a:t>
             </a:r>
             <a:endParaRPr lang="en-US" dirty="0"/>
@@ -4310,7 +4310,7 @@
           <a:p>
             <a:pPr lvl="0"/>
             <a:r>
-              <a:rPr lang="en-US" smtClean="0"/>
+              <a:rPr lang="en-US"/>
               <a:t>Click to edit Master text styles</a:t>
             </a:r>
           </a:p>
@@ -4334,7 +4334,7 @@
             <a:fld id="{D0DF5E60-9974-AC48-9591-99C2BB44B7CF}" type="datetimeFigureOut">
               <a:rPr lang="en-US" dirty="0"/>
               <a:pPr/>
-              <a:t>5/15/2020</a:t>
+              <a:t>5/16/2020</a:t>
             </a:fld>
             <a:endParaRPr lang="en-US" dirty="0"/>
           </a:p>
@@ -4435,7 +4435,7 @@
           </a:lstStyle>
           <a:p>
             <a:r>
-              <a:rPr lang="en-US" smtClean="0"/>
+              <a:rPr lang="en-US"/>
               <a:t>Click to edit Master title style</a:t>
             </a:r>
             <a:endParaRPr lang="en-US" dirty="0"/>
@@ -4547,7 +4547,7 @@
           </a:lstStyle>
           <a:p>
             <a:r>
-              <a:rPr lang="en-US" smtClean="0"/>
+              <a:rPr lang="en-US"/>
               <a:t>Click icon to add picture</a:t>
             </a:r>
             <a:endParaRPr lang="en-US" dirty="0"/>
@@ -4615,7 +4615,7 @@
           <a:p>
             <a:pPr lvl="0"/>
             <a:r>
-              <a:rPr lang="en-US" smtClean="0"/>
+              <a:rPr lang="en-US"/>
               <a:t>Click to edit Master text styles</a:t>
             </a:r>
           </a:p>
@@ -4644,7 +4644,7 @@
             <a:fld id="{18C79C5D-2A6F-F04D-97DA-BEF2467B64E4}" type="datetimeFigureOut">
               <a:rPr lang="en-US" dirty="0"/>
               <a:pPr/>
-              <a:t>5/15/2020</a:t>
+              <a:t>5/16/2020</a:t>
             </a:fld>
             <a:endParaRPr lang="en-US" dirty="0"/>
           </a:p>
@@ -4766,7 +4766,7 @@
           <a:lstStyle/>
           <a:p>
             <a:r>
-              <a:rPr lang="en-US" smtClean="0"/>
+              <a:rPr lang="en-US"/>
               <a:t>Click to edit Master title style</a:t>
             </a:r>
             <a:endParaRPr lang="en-US" dirty="0"/>
@@ -4807,35 +4807,35 @@
           <a:p>
             <a:pPr lvl="0"/>
             <a:r>
-              <a:rPr lang="en-US" smtClean="0"/>
+              <a:rPr lang="en-US"/>
               <a:t>Click to edit Master text styles</a:t>
             </a:r>
           </a:p>
           <a:p>
             <a:pPr lvl="1"/>
             <a:r>
-              <a:rPr lang="en-US" smtClean="0"/>
+              <a:rPr lang="en-US"/>
               <a:t>Second level</a:t>
             </a:r>
           </a:p>
           <a:p>
             <a:pPr lvl="2"/>
             <a:r>
-              <a:rPr lang="en-US" smtClean="0"/>
+              <a:rPr lang="en-US"/>
               <a:t>Third level</a:t>
             </a:r>
           </a:p>
           <a:p>
             <a:pPr lvl="3"/>
             <a:r>
-              <a:rPr lang="en-US" smtClean="0"/>
+              <a:rPr lang="en-US"/>
               <a:t>Fourth level</a:t>
             </a:r>
           </a:p>
           <a:p>
             <a:pPr lvl="4"/>
             <a:r>
-              <a:rPr lang="en-US" smtClean="0"/>
+              <a:rPr lang="en-US"/>
               <a:t>Fifth level</a:t>
             </a:r>
             <a:endParaRPr lang="en-US" dirty="0"/>
@@ -4911,7 +4911,7 @@
             <a:fld id="{09B482E8-6E0E-1B4F-B1FD-C69DB9E858D9}" type="datetimeFigureOut">
               <a:rPr lang="en-US" dirty="0"/>
               <a:pPr/>
-              <a:t>5/15/2020</a:t>
+              <a:t>5/16/2020</a:t>
             </a:fld>
             <a:endParaRPr lang="en-US" dirty="0"/>
           </a:p>
@@ -5373,16 +5373,12 @@
           <a:lstStyle/>
           <a:p>
             <a:r>
-              <a:rPr lang="en-US" dirty="0" smtClean="0">
+              <a:rPr lang="en-US" dirty="0">
                 <a:latin typeface="Times New Roman" panose="02020603050405020304" pitchFamily="18" charset="0"/>
                 <a:cs typeface="Times New Roman" panose="02020603050405020304" pitchFamily="18" charset="0"/>
               </a:rPr>
               <a:t>DỰ ÁN: GIFT SHOP – GỢI Ý CHỌN QUÀ</a:t>
             </a:r>
-            <a:endParaRPr lang="en-US" dirty="0">
-              <a:latin typeface="Times New Roman" panose="02020603050405020304" pitchFamily="18" charset="0"/>
-              <a:cs typeface="Times New Roman" panose="02020603050405020304" pitchFamily="18" charset="0"/>
-            </a:endParaRPr>
           </a:p>
         </p:txBody>
       </p:sp>
@@ -5404,7 +5400,7 @@
           <a:lstStyle/>
           <a:p>
             <a:r>
-              <a:rPr lang="en-US" dirty="0" smtClean="0"/>
+              <a:rPr lang="en-US" dirty="0"/>
               <a:t>THÀNH VIÊN: HOÀN (Lead) – HÙNG – VIỆT</a:t>
             </a:r>
           </a:p>
@@ -5423,13 +5419,6 @@
   <p:clrMapOvr>
     <a:masterClrMapping/>
   </p:clrMapOvr>
-  <p:timing>
-    <p:tnLst>
-      <p:par>
-        <p:cTn id="1" dur="indefinite" restart="never" nodeType="tmRoot"/>
-      </p:par>
-    </p:tnLst>
-  </p:timing>
 </p:sld>
 </file>
 
@@ -5466,10 +5455,9 @@
           <a:lstStyle/>
           <a:p>
             <a:r>
-              <a:rPr lang="en-US" dirty="0" smtClean="0"/>
+              <a:rPr lang="en-US" dirty="0"/>
               <a:t>NHỮNG KHÓ KHĂN GẶP PHẢI</a:t>
             </a:r>
-            <a:endParaRPr lang="en-US" dirty="0"/>
           </a:p>
         </p:txBody>
       </p:sp>
@@ -5545,10 +5533,9 @@
           <a:lstStyle/>
           <a:p>
             <a:r>
-              <a:rPr lang="en-US" dirty="0" smtClean="0"/>
+              <a:rPr lang="en-US" dirty="0"/>
               <a:t>TỔNG KẾT</a:t>
             </a:r>
-            <a:endParaRPr lang="en-US" dirty="0"/>
           </a:p>
         </p:txBody>
       </p:sp>
@@ -5575,12 +5562,12 @@
           <a:lstStyle/>
           <a:p>
             <a:r>
-              <a:rPr lang="en-US" dirty="0" smtClean="0"/>
+              <a:rPr lang="en-US" dirty="0"/>
               <a:t>SẢN PHẨM :</a:t>
             </a:r>
           </a:p>
           <a:p>
-            <a:endParaRPr lang="en-US" dirty="0" smtClean="0"/>
+            <a:endParaRPr lang="en-US" dirty="0"/>
           </a:p>
         </p:txBody>
       </p:sp>
@@ -5630,10 +5617,12 @@
           <a:lstStyle/>
           <a:p>
             <a:r>
-              <a:rPr lang="en-US" dirty="0" smtClean="0"/>
+              <a:rPr lang="en-US" dirty="0">
+                <a:latin typeface="Arial" panose="020B0604020202020204" pitchFamily="34" charset="0"/>
+                <a:cs typeface="Arial" panose="020B0604020202020204" pitchFamily="34" charset="0"/>
+              </a:rPr>
               <a:t>NHỮNG CẢI TIẾN ĐỀ XUẤT </a:t>
             </a:r>
-            <a:endParaRPr lang="en-US" dirty="0"/>
           </a:p>
         </p:txBody>
       </p:sp>
@@ -5646,7 +5635,7 @@
         <p:spPr>
           <a:xfrm>
             <a:off x="1094704" y="2485623"/>
-            <a:ext cx="8564451" cy="1200329"/>
+            <a:ext cx="8564451" cy="1754326"/>
           </a:xfrm>
           <a:prstGeom prst="rect">
             <a:avLst/>
@@ -5664,208 +5653,222 @@
               <a:buChar char="•"/>
             </a:pPr>
             <a:r>
-              <a:rPr lang="en-US" dirty="0" err="1" smtClean="0"/>
+              <a:rPr lang="en-US" dirty="0" err="1">
+                <a:latin typeface="Arial" panose="020B0604020202020204" pitchFamily="34" charset="0"/>
+                <a:cs typeface="Arial" panose="020B0604020202020204" pitchFamily="34" charset="0"/>
+              </a:rPr>
               <a:t>Tìm</a:t>
             </a:r>
             <a:r>
-              <a:rPr lang="en-US" dirty="0" smtClean="0"/>
-              <a:t> </a:t>
-            </a:r>
-            <a:r>
-              <a:rPr lang="en-US" dirty="0" err="1" smtClean="0"/>
+              <a:rPr lang="en-US" dirty="0">
+                <a:latin typeface="Arial" panose="020B0604020202020204" pitchFamily="34" charset="0"/>
+                <a:cs typeface="Arial" panose="020B0604020202020204" pitchFamily="34" charset="0"/>
+              </a:rPr>
+              <a:t> </a:t>
+            </a:r>
+            <a:r>
+              <a:rPr lang="en-US" dirty="0" err="1">
+                <a:latin typeface="Arial" panose="020B0604020202020204" pitchFamily="34" charset="0"/>
+                <a:cs typeface="Arial" panose="020B0604020202020204" pitchFamily="34" charset="0"/>
+              </a:rPr>
               <a:t>kiếm</a:t>
             </a:r>
             <a:r>
-              <a:rPr lang="en-US" dirty="0" smtClean="0"/>
-              <a:t> </a:t>
-            </a:r>
-            <a:r>
-              <a:rPr lang="en-US" dirty="0" err="1" smtClean="0"/>
+              <a:rPr lang="en-US" dirty="0">
+                <a:latin typeface="Arial" panose="020B0604020202020204" pitchFamily="34" charset="0"/>
+                <a:cs typeface="Arial" panose="020B0604020202020204" pitchFamily="34" charset="0"/>
+              </a:rPr>
+              <a:t> </a:t>
+            </a:r>
+            <a:r>
+              <a:rPr lang="en-US" dirty="0" err="1">
+                <a:latin typeface="Arial" panose="020B0604020202020204" pitchFamily="34" charset="0"/>
+                <a:cs typeface="Arial" panose="020B0604020202020204" pitchFamily="34" charset="0"/>
+              </a:rPr>
               <a:t>thêm</a:t>
             </a:r>
             <a:r>
-              <a:rPr lang="en-US" dirty="0" smtClean="0"/>
-              <a:t> </a:t>
-            </a:r>
-            <a:r>
-              <a:rPr lang="en-US" dirty="0" err="1" smtClean="0"/>
+              <a:rPr lang="en-US" dirty="0">
+                <a:latin typeface="Arial" panose="020B0604020202020204" pitchFamily="34" charset="0"/>
+                <a:cs typeface="Arial" panose="020B0604020202020204" pitchFamily="34" charset="0"/>
+              </a:rPr>
+              <a:t> </a:t>
+            </a:r>
+            <a:r>
+              <a:rPr lang="en-US" dirty="0" err="1">
+                <a:latin typeface="Arial" panose="020B0604020202020204" pitchFamily="34" charset="0"/>
+                <a:cs typeface="Arial" panose="020B0604020202020204" pitchFamily="34" charset="0"/>
+              </a:rPr>
               <a:t>dữ</a:t>
             </a:r>
             <a:r>
-              <a:rPr lang="en-US" dirty="0" smtClean="0"/>
-              <a:t> </a:t>
-            </a:r>
-            <a:r>
-              <a:rPr lang="en-US" dirty="0" err="1" smtClean="0"/>
+              <a:rPr lang="en-US" dirty="0">
+                <a:latin typeface="Arial" panose="020B0604020202020204" pitchFamily="34" charset="0"/>
+                <a:cs typeface="Arial" panose="020B0604020202020204" pitchFamily="34" charset="0"/>
+              </a:rPr>
+              <a:t> </a:t>
+            </a:r>
+            <a:r>
+              <a:rPr lang="en-US" dirty="0" err="1">
+                <a:latin typeface="Arial" panose="020B0604020202020204" pitchFamily="34" charset="0"/>
+                <a:cs typeface="Arial" panose="020B0604020202020204" pitchFamily="34" charset="0"/>
+              </a:rPr>
               <a:t>liệu</a:t>
             </a:r>
             <a:r>
-              <a:rPr lang="en-US" dirty="0" smtClean="0"/>
-              <a:t> </a:t>
-            </a:r>
-            <a:r>
-              <a:rPr lang="en-US" dirty="0" err="1" smtClean="0"/>
+              <a:rPr lang="en-US" dirty="0">
+                <a:latin typeface="Arial" panose="020B0604020202020204" pitchFamily="34" charset="0"/>
+                <a:cs typeface="Arial" panose="020B0604020202020204" pitchFamily="34" charset="0"/>
+              </a:rPr>
+              <a:t> </a:t>
+            </a:r>
+            <a:r>
+              <a:rPr lang="en-US" dirty="0" err="1">
+                <a:latin typeface="Arial" panose="020B0604020202020204" pitchFamily="34" charset="0"/>
+                <a:cs typeface="Arial" panose="020B0604020202020204" pitchFamily="34" charset="0"/>
+              </a:rPr>
               <a:t>về</a:t>
             </a:r>
             <a:r>
-              <a:rPr lang="en-US" dirty="0" smtClean="0"/>
-              <a:t> </a:t>
-            </a:r>
-            <a:r>
-              <a:rPr lang="en-US" dirty="0" err="1" smtClean="0"/>
+              <a:rPr lang="en-US" dirty="0">
+                <a:latin typeface="Arial" panose="020B0604020202020204" pitchFamily="34" charset="0"/>
+                <a:cs typeface="Arial" panose="020B0604020202020204" pitchFamily="34" charset="0"/>
+              </a:rPr>
+              <a:t> </a:t>
+            </a:r>
+            <a:r>
+              <a:rPr lang="en-US" dirty="0" err="1">
+                <a:latin typeface="Arial" panose="020B0604020202020204" pitchFamily="34" charset="0"/>
+                <a:cs typeface="Arial" panose="020B0604020202020204" pitchFamily="34" charset="0"/>
+              </a:rPr>
               <a:t>sản</a:t>
             </a:r>
             <a:r>
-              <a:rPr lang="en-US" dirty="0" smtClean="0"/>
-              <a:t> </a:t>
-            </a:r>
-            <a:r>
-              <a:rPr lang="en-US" dirty="0" err="1" smtClean="0"/>
+              <a:rPr lang="en-US" dirty="0">
+                <a:latin typeface="Arial" panose="020B0604020202020204" pitchFamily="34" charset="0"/>
+                <a:cs typeface="Arial" panose="020B0604020202020204" pitchFamily="34" charset="0"/>
+              </a:rPr>
+              <a:t> </a:t>
+            </a:r>
+            <a:r>
+              <a:rPr lang="en-US" dirty="0" err="1">
+                <a:latin typeface="Arial" panose="020B0604020202020204" pitchFamily="34" charset="0"/>
+                <a:cs typeface="Arial" panose="020B0604020202020204" pitchFamily="34" charset="0"/>
+              </a:rPr>
               <a:t>phẩm</a:t>
             </a:r>
             <a:r>
-              <a:rPr lang="en-US" dirty="0" smtClean="0"/>
-              <a:t> </a:t>
-            </a:r>
-            <a:r>
-              <a:rPr lang="en-US" dirty="0" err="1" smtClean="0"/>
+              <a:rPr lang="en-US" dirty="0">
+                <a:latin typeface="Arial" panose="020B0604020202020204" pitchFamily="34" charset="0"/>
+                <a:cs typeface="Arial" panose="020B0604020202020204" pitchFamily="34" charset="0"/>
+              </a:rPr>
+              <a:t> </a:t>
+            </a:r>
+            <a:r>
+              <a:rPr lang="en-US" dirty="0" err="1">
+                <a:latin typeface="Arial" panose="020B0604020202020204" pitchFamily="34" charset="0"/>
+                <a:cs typeface="Arial" panose="020B0604020202020204" pitchFamily="34" charset="0"/>
+              </a:rPr>
               <a:t>cho</a:t>
             </a:r>
             <a:r>
-              <a:rPr lang="en-US" dirty="0" smtClean="0"/>
-              <a:t> </a:t>
-            </a:r>
-            <a:r>
-              <a:rPr lang="en-US" dirty="0" err="1" smtClean="0"/>
+              <a:rPr lang="en-US" dirty="0">
+                <a:latin typeface="Arial" panose="020B0604020202020204" pitchFamily="34" charset="0"/>
+                <a:cs typeface="Arial" panose="020B0604020202020204" pitchFamily="34" charset="0"/>
+              </a:rPr>
+              <a:t> </a:t>
+            </a:r>
+            <a:r>
+              <a:rPr lang="en-US" dirty="0" err="1">
+                <a:latin typeface="Arial" panose="020B0604020202020204" pitchFamily="34" charset="0"/>
+                <a:cs typeface="Arial" panose="020B0604020202020204" pitchFamily="34" charset="0"/>
+              </a:rPr>
               <a:t>đa</a:t>
             </a:r>
             <a:r>
-              <a:rPr lang="en-US" dirty="0" smtClean="0"/>
-              <a:t> </a:t>
-            </a:r>
-            <a:r>
-              <a:rPr lang="en-US" dirty="0" err="1" smtClean="0"/>
+              <a:rPr lang="en-US" dirty="0">
+                <a:latin typeface="Arial" panose="020B0604020202020204" pitchFamily="34" charset="0"/>
+                <a:cs typeface="Arial" panose="020B0604020202020204" pitchFamily="34" charset="0"/>
+              </a:rPr>
+              <a:t> </a:t>
+            </a:r>
+            <a:r>
+              <a:rPr lang="en-US" dirty="0" err="1">
+                <a:latin typeface="Arial" panose="020B0604020202020204" pitchFamily="34" charset="0"/>
+                <a:cs typeface="Arial" panose="020B0604020202020204" pitchFamily="34" charset="0"/>
+              </a:rPr>
               <a:t>dạng</a:t>
             </a:r>
             <a:r>
-              <a:rPr lang="en-US" dirty="0" smtClean="0"/>
-              <a:t> </a:t>
-            </a:r>
-            <a:r>
-              <a:rPr lang="en-US" dirty="0" err="1" smtClean="0"/>
+              <a:rPr lang="en-US" dirty="0">
+                <a:latin typeface="Arial" panose="020B0604020202020204" pitchFamily="34" charset="0"/>
+                <a:cs typeface="Arial" panose="020B0604020202020204" pitchFamily="34" charset="0"/>
+              </a:rPr>
+              <a:t> </a:t>
+            </a:r>
+            <a:r>
+              <a:rPr lang="en-US" dirty="0" err="1">
+                <a:latin typeface="Arial" panose="020B0604020202020204" pitchFamily="34" charset="0"/>
+                <a:cs typeface="Arial" panose="020B0604020202020204" pitchFamily="34" charset="0"/>
+              </a:rPr>
               <a:t>và</a:t>
             </a:r>
             <a:r>
-              <a:rPr lang="en-US" dirty="0" smtClean="0"/>
-              <a:t> </a:t>
-            </a:r>
-            <a:r>
-              <a:rPr lang="en-US" dirty="0" err="1" smtClean="0"/>
+              <a:rPr lang="en-US" dirty="0">
+                <a:latin typeface="Arial" panose="020B0604020202020204" pitchFamily="34" charset="0"/>
+                <a:cs typeface="Arial" panose="020B0604020202020204" pitchFamily="34" charset="0"/>
+              </a:rPr>
+              <a:t> </a:t>
+            </a:r>
+            <a:r>
+              <a:rPr lang="en-US" dirty="0" err="1">
+                <a:latin typeface="Arial" panose="020B0604020202020204" pitchFamily="34" charset="0"/>
+                <a:cs typeface="Arial" panose="020B0604020202020204" pitchFamily="34" charset="0"/>
+              </a:rPr>
               <a:t>phong</a:t>
             </a:r>
             <a:r>
-              <a:rPr lang="en-US" dirty="0" smtClean="0"/>
-              <a:t> </a:t>
-            </a:r>
-            <a:r>
-              <a:rPr lang="en-US" dirty="0" err="1" smtClean="0"/>
+              <a:rPr lang="en-US" dirty="0">
+                <a:latin typeface="Arial" panose="020B0604020202020204" pitchFamily="34" charset="0"/>
+                <a:cs typeface="Arial" panose="020B0604020202020204" pitchFamily="34" charset="0"/>
+              </a:rPr>
+              <a:t> </a:t>
+            </a:r>
+            <a:r>
+              <a:rPr lang="en-US" dirty="0" err="1">
+                <a:latin typeface="Arial" panose="020B0604020202020204" pitchFamily="34" charset="0"/>
+                <a:cs typeface="Arial" panose="020B0604020202020204" pitchFamily="34" charset="0"/>
+              </a:rPr>
               <a:t>phú</a:t>
             </a:r>
             <a:r>
-              <a:rPr lang="en-US" dirty="0" smtClean="0"/>
-              <a:t> </a:t>
-            </a:r>
-            <a:r>
-              <a:rPr lang="en-US" dirty="0" err="1" smtClean="0"/>
+              <a:rPr lang="en-US" dirty="0">
+                <a:latin typeface="Arial" panose="020B0604020202020204" pitchFamily="34" charset="0"/>
+                <a:cs typeface="Arial" panose="020B0604020202020204" pitchFamily="34" charset="0"/>
+              </a:rPr>
+              <a:t> </a:t>
+            </a:r>
+            <a:r>
+              <a:rPr lang="en-US" dirty="0" err="1">
+                <a:latin typeface="Arial" panose="020B0604020202020204" pitchFamily="34" charset="0"/>
+                <a:cs typeface="Arial" panose="020B0604020202020204" pitchFamily="34" charset="0"/>
+              </a:rPr>
               <a:t>hơn</a:t>
             </a:r>
-            <a:endParaRPr lang="en-US" dirty="0" smtClean="0"/>
+            <a:endParaRPr lang="en-US" dirty="0">
+              <a:latin typeface="Arial" panose="020B0604020202020204" pitchFamily="34" charset="0"/>
+              <a:cs typeface="Arial" panose="020B0604020202020204" pitchFamily="34" charset="0"/>
+            </a:endParaRPr>
           </a:p>
           <a:p>
             <a:pPr marL="285750" indent="-285750">
               <a:buFont typeface="Arial" panose="020B0604020202020204" pitchFamily="34" charset="0"/>
               <a:buChar char="•"/>
             </a:pPr>
-            <a:r>
-              <a:rPr lang="en-US" dirty="0" err="1" smtClean="0"/>
-              <a:t>Cải</a:t>
-            </a:r>
-            <a:r>
-              <a:rPr lang="en-US" dirty="0" smtClean="0"/>
-              <a:t> </a:t>
-            </a:r>
-            <a:r>
-              <a:rPr lang="en-US" dirty="0" err="1" smtClean="0"/>
-              <a:t>tiến</a:t>
-            </a:r>
-            <a:r>
-              <a:rPr lang="en-US" dirty="0" smtClean="0"/>
-              <a:t> </a:t>
-            </a:r>
-            <a:r>
-              <a:rPr lang="en-US" dirty="0" err="1" smtClean="0"/>
-              <a:t>thêm</a:t>
-            </a:r>
-            <a:r>
-              <a:rPr lang="en-US" dirty="0" smtClean="0"/>
-              <a:t> </a:t>
-            </a:r>
-            <a:r>
-              <a:rPr lang="en-US" dirty="0" err="1" smtClean="0"/>
-              <a:t>bộ</a:t>
-            </a:r>
-            <a:r>
-              <a:rPr lang="en-US" dirty="0" smtClean="0"/>
-              <a:t> </a:t>
-            </a:r>
-            <a:r>
-              <a:rPr lang="en-US" dirty="0" err="1" smtClean="0"/>
-              <a:t>câu</a:t>
-            </a:r>
-            <a:r>
-              <a:rPr lang="en-US" dirty="0" smtClean="0"/>
-              <a:t> </a:t>
-            </a:r>
-            <a:r>
-              <a:rPr lang="en-US" dirty="0" err="1" smtClean="0"/>
-              <a:t>hỏi</a:t>
-            </a:r>
-            <a:r>
-              <a:rPr lang="en-US" dirty="0" smtClean="0"/>
-              <a:t> chi </a:t>
-            </a:r>
-            <a:r>
-              <a:rPr lang="en-US" dirty="0" err="1" smtClean="0"/>
-              <a:t>tiết</a:t>
-            </a:r>
-            <a:r>
-              <a:rPr lang="en-US" dirty="0" smtClean="0"/>
-              <a:t> </a:t>
-            </a:r>
-            <a:r>
-              <a:rPr lang="en-US" dirty="0" err="1" smtClean="0"/>
-              <a:t>hơn</a:t>
-            </a:r>
-            <a:r>
-              <a:rPr lang="en-US" dirty="0" smtClean="0"/>
-              <a:t>: </a:t>
-            </a:r>
-            <a:r>
-              <a:rPr lang="en-US" dirty="0" err="1" smtClean="0"/>
-              <a:t>độ</a:t>
-            </a:r>
-            <a:r>
-              <a:rPr lang="en-US" dirty="0" smtClean="0"/>
-              <a:t> </a:t>
-            </a:r>
-            <a:r>
-              <a:rPr lang="en-US" dirty="0" err="1" smtClean="0"/>
-              <a:t>tuổi</a:t>
-            </a:r>
-            <a:r>
-              <a:rPr lang="en-US" dirty="0" smtClean="0"/>
-              <a:t>,</a:t>
-            </a:r>
+            <a:endParaRPr lang="en-US" dirty="0">
+              <a:latin typeface="Arial" panose="020B0604020202020204" pitchFamily="34" charset="0"/>
+              <a:cs typeface="Arial" panose="020B0604020202020204" pitchFamily="34" charset="0"/>
+            </a:endParaRPr>
           </a:p>
           <a:p>
             <a:pPr marL="285750" indent="-285750">
@@ -5873,108 +5876,144 @@
               <a:buChar char="•"/>
             </a:pPr>
             <a:r>
-              <a:rPr lang="en-US" dirty="0" err="1" smtClean="0"/>
-              <a:t>Thêm</a:t>
-            </a:r>
-            <a:r>
-              <a:rPr lang="en-US" dirty="0" smtClean="0"/>
-              <a:t> </a:t>
-            </a:r>
-            <a:r>
-              <a:rPr lang="en-US" dirty="0" err="1" smtClean="0"/>
-              <a:t>mục</a:t>
-            </a:r>
-            <a:r>
-              <a:rPr lang="en-US" dirty="0" smtClean="0"/>
-              <a:t> </a:t>
-            </a:r>
-            <a:r>
-              <a:rPr lang="en-US" dirty="0" err="1" smtClean="0"/>
-              <a:t>hiển</a:t>
-            </a:r>
-            <a:r>
-              <a:rPr lang="en-US" dirty="0" smtClean="0"/>
-              <a:t> </a:t>
-            </a:r>
-            <a:r>
-              <a:rPr lang="en-US" dirty="0" err="1" smtClean="0"/>
-              <a:t>thị</a:t>
-            </a:r>
-            <a:r>
-              <a:rPr lang="en-US" dirty="0" smtClean="0"/>
-              <a:t> </a:t>
-            </a:r>
-            <a:r>
-              <a:rPr lang="en-US" dirty="0" err="1" smtClean="0"/>
-              <a:t>đề</a:t>
-            </a:r>
-            <a:r>
-              <a:rPr lang="en-US" dirty="0" smtClean="0"/>
-              <a:t> </a:t>
-            </a:r>
-            <a:r>
-              <a:rPr lang="en-US" dirty="0" err="1" smtClean="0"/>
-              <a:t>xuất</a:t>
-            </a:r>
-            <a:r>
-              <a:rPr lang="en-US" dirty="0" smtClean="0"/>
-              <a:t> </a:t>
-            </a:r>
-            <a:r>
-              <a:rPr lang="en-US" dirty="0" err="1" smtClean="0"/>
-              <a:t>nhanh</a:t>
-            </a:r>
-            <a:r>
-              <a:rPr lang="en-US" dirty="0" smtClean="0"/>
-              <a:t> </a:t>
-            </a:r>
-            <a:r>
-              <a:rPr lang="en-US" dirty="0" err="1" smtClean="0"/>
-              <a:t>cho</a:t>
-            </a:r>
-            <a:r>
-              <a:rPr lang="en-US" dirty="0" smtClean="0"/>
-              <a:t> </a:t>
-            </a:r>
-            <a:r>
-              <a:rPr lang="en-US" dirty="0" err="1" smtClean="0"/>
-              <a:t>sự</a:t>
-            </a:r>
-            <a:r>
-              <a:rPr lang="en-US" dirty="0" smtClean="0"/>
-              <a:t> </a:t>
-            </a:r>
-            <a:r>
-              <a:rPr lang="en-US" dirty="0" err="1" smtClean="0"/>
-              <a:t>kiện</a:t>
-            </a:r>
-            <a:r>
-              <a:rPr lang="en-US" dirty="0" smtClean="0"/>
-              <a:t> </a:t>
-            </a:r>
-            <a:r>
-              <a:rPr lang="en-US" dirty="0" err="1" smtClean="0"/>
-              <a:t>sắp</a:t>
-            </a:r>
-            <a:r>
-              <a:rPr lang="en-US" dirty="0" smtClean="0"/>
-              <a:t> </a:t>
-            </a:r>
-            <a:r>
-              <a:rPr lang="en-US" dirty="0" err="1" smtClean="0"/>
-              <a:t>diễn</a:t>
-            </a:r>
-            <a:r>
-              <a:rPr lang="en-US" dirty="0" smtClean="0"/>
-              <a:t> </a:t>
-            </a:r>
-            <a:r>
-              <a:rPr lang="en-US" dirty="0" err="1" smtClean="0"/>
-              <a:t>ra</a:t>
-            </a:r>
-            <a:r>
-              <a:rPr lang="en-US" dirty="0" smtClean="0"/>
-              <a:t> </a:t>
+              <a:rPr lang="en-US" dirty="0" err="1">
+                <a:latin typeface="Arial" panose="020B0604020202020204" pitchFamily="34" charset="0"/>
+                <a:cs typeface="Arial" panose="020B0604020202020204" pitchFamily="34" charset="0"/>
+              </a:rPr>
+              <a:t>Cải</a:t>
+            </a:r>
+            <a:r>
+              <a:rPr lang="en-US" dirty="0">
+                <a:latin typeface="Arial" panose="020B0604020202020204" pitchFamily="34" charset="0"/>
+                <a:cs typeface="Arial" panose="020B0604020202020204" pitchFamily="34" charset="0"/>
+              </a:rPr>
+              <a:t> </a:t>
+            </a:r>
+            <a:r>
+              <a:rPr lang="en-US" dirty="0" err="1">
+                <a:latin typeface="Arial" panose="020B0604020202020204" pitchFamily="34" charset="0"/>
+                <a:cs typeface="Arial" panose="020B0604020202020204" pitchFamily="34" charset="0"/>
+              </a:rPr>
+              <a:t>tiến</a:t>
+            </a:r>
+            <a:r>
+              <a:rPr lang="en-US" dirty="0">
+                <a:latin typeface="Arial" panose="020B0604020202020204" pitchFamily="34" charset="0"/>
+                <a:cs typeface="Arial" panose="020B0604020202020204" pitchFamily="34" charset="0"/>
+              </a:rPr>
+              <a:t> </a:t>
+            </a:r>
+            <a:r>
+              <a:rPr lang="en-US" dirty="0" err="1">
+                <a:latin typeface="Arial" panose="020B0604020202020204" pitchFamily="34" charset="0"/>
+                <a:cs typeface="Arial" panose="020B0604020202020204" pitchFamily="34" charset="0"/>
+              </a:rPr>
+              <a:t>thêm</a:t>
+            </a:r>
+            <a:r>
+              <a:rPr lang="en-US" dirty="0">
+                <a:latin typeface="Arial" panose="020B0604020202020204" pitchFamily="34" charset="0"/>
+                <a:cs typeface="Arial" panose="020B0604020202020204" pitchFamily="34" charset="0"/>
+              </a:rPr>
+              <a:t> </a:t>
+            </a:r>
+            <a:r>
+              <a:rPr lang="en-US" dirty="0" err="1">
+                <a:latin typeface="Arial" panose="020B0604020202020204" pitchFamily="34" charset="0"/>
+                <a:cs typeface="Arial" panose="020B0604020202020204" pitchFamily="34" charset="0"/>
+              </a:rPr>
+              <a:t>bộ</a:t>
+            </a:r>
+            <a:r>
+              <a:rPr lang="en-US" dirty="0">
+                <a:latin typeface="Arial" panose="020B0604020202020204" pitchFamily="34" charset="0"/>
+                <a:cs typeface="Arial" panose="020B0604020202020204" pitchFamily="34" charset="0"/>
+              </a:rPr>
+              <a:t> </a:t>
+            </a:r>
+            <a:r>
+              <a:rPr lang="en-US" dirty="0" err="1">
+                <a:latin typeface="Arial" panose="020B0604020202020204" pitchFamily="34" charset="0"/>
+                <a:cs typeface="Arial" panose="020B0604020202020204" pitchFamily="34" charset="0"/>
+              </a:rPr>
+              <a:t>câu</a:t>
+            </a:r>
+            <a:r>
+              <a:rPr lang="en-US" dirty="0">
+                <a:latin typeface="Arial" panose="020B0604020202020204" pitchFamily="34" charset="0"/>
+                <a:cs typeface="Arial" panose="020B0604020202020204" pitchFamily="34" charset="0"/>
+              </a:rPr>
+              <a:t> </a:t>
+            </a:r>
+            <a:r>
+              <a:rPr lang="en-US" dirty="0" err="1">
+                <a:latin typeface="Arial" panose="020B0604020202020204" pitchFamily="34" charset="0"/>
+                <a:cs typeface="Arial" panose="020B0604020202020204" pitchFamily="34" charset="0"/>
+              </a:rPr>
+              <a:t>hỏi</a:t>
+            </a:r>
+            <a:r>
+              <a:rPr lang="en-US" dirty="0">
+                <a:latin typeface="Arial" panose="020B0604020202020204" pitchFamily="34" charset="0"/>
+                <a:cs typeface="Arial" panose="020B0604020202020204" pitchFamily="34" charset="0"/>
+              </a:rPr>
+              <a:t> chi </a:t>
+            </a:r>
+            <a:r>
+              <a:rPr lang="en-US" dirty="0" err="1">
+                <a:latin typeface="Arial" panose="020B0604020202020204" pitchFamily="34" charset="0"/>
+                <a:cs typeface="Arial" panose="020B0604020202020204" pitchFamily="34" charset="0"/>
+              </a:rPr>
+              <a:t>tiết</a:t>
+            </a:r>
+            <a:r>
+              <a:rPr lang="en-US" dirty="0">
+                <a:latin typeface="Arial" panose="020B0604020202020204" pitchFamily="34" charset="0"/>
+                <a:cs typeface="Arial" panose="020B0604020202020204" pitchFamily="34" charset="0"/>
+              </a:rPr>
+              <a:t> </a:t>
+            </a:r>
+            <a:r>
+              <a:rPr lang="en-US" dirty="0" err="1">
+                <a:latin typeface="Arial" panose="020B0604020202020204" pitchFamily="34" charset="0"/>
+                <a:cs typeface="Arial" panose="020B0604020202020204" pitchFamily="34" charset="0"/>
+              </a:rPr>
+              <a:t>hơn</a:t>
+            </a:r>
+            <a:r>
+              <a:rPr lang="en-US" dirty="0">
+                <a:latin typeface="Arial" panose="020B0604020202020204" pitchFamily="34" charset="0"/>
+                <a:cs typeface="Arial" panose="020B0604020202020204" pitchFamily="34" charset="0"/>
+              </a:rPr>
+              <a:t>: </a:t>
+            </a:r>
+            <a:r>
+              <a:rPr lang="en-US" dirty="0" err="1">
+                <a:latin typeface="Arial" panose="020B0604020202020204" pitchFamily="34" charset="0"/>
+                <a:cs typeface="Arial" panose="020B0604020202020204" pitchFamily="34" charset="0"/>
+              </a:rPr>
+              <a:t>độ</a:t>
+            </a:r>
+            <a:r>
+              <a:rPr lang="en-US" dirty="0">
+                <a:latin typeface="Arial" panose="020B0604020202020204" pitchFamily="34" charset="0"/>
+                <a:cs typeface="Arial" panose="020B0604020202020204" pitchFamily="34" charset="0"/>
+              </a:rPr>
+              <a:t> </a:t>
+            </a:r>
+            <a:r>
+              <a:rPr lang="en-US" dirty="0" err="1">
+                <a:latin typeface="Arial" panose="020B0604020202020204" pitchFamily="34" charset="0"/>
+                <a:cs typeface="Arial" panose="020B0604020202020204" pitchFamily="34" charset="0"/>
+              </a:rPr>
+              <a:t>tuổi</a:t>
+            </a:r>
+            <a:r>
+              <a:rPr lang="en-US" dirty="0">
+                <a:latin typeface="Arial" panose="020B0604020202020204" pitchFamily="34" charset="0"/>
+                <a:cs typeface="Arial" panose="020B0604020202020204" pitchFamily="34" charset="0"/>
+              </a:rPr>
+              <a:t>,</a:t>
             </a:r>
           </a:p>
           <a:p>
@@ -5982,7 +6021,208 @@
               <a:buFont typeface="Arial" panose="020B0604020202020204" pitchFamily="34" charset="0"/>
               <a:buChar char="•"/>
             </a:pPr>
-            <a:endParaRPr lang="en-US" dirty="0"/>
+            <a:endParaRPr lang="en-US" dirty="0">
+              <a:latin typeface="Arial" panose="020B0604020202020204" pitchFamily="34" charset="0"/>
+              <a:cs typeface="Arial" panose="020B0604020202020204" pitchFamily="34" charset="0"/>
+            </a:endParaRPr>
+          </a:p>
+          <a:p>
+            <a:pPr marL="285750" indent="-285750">
+              <a:buFont typeface="Arial" panose="020B0604020202020204" pitchFamily="34" charset="0"/>
+              <a:buChar char="•"/>
+            </a:pPr>
+            <a:r>
+              <a:rPr lang="en-US" dirty="0" err="1">
+                <a:latin typeface="Arial" panose="020B0604020202020204" pitchFamily="34" charset="0"/>
+                <a:cs typeface="Arial" panose="020B0604020202020204" pitchFamily="34" charset="0"/>
+              </a:rPr>
+              <a:t>Thêm</a:t>
+            </a:r>
+            <a:r>
+              <a:rPr lang="en-US" dirty="0">
+                <a:latin typeface="Arial" panose="020B0604020202020204" pitchFamily="34" charset="0"/>
+                <a:cs typeface="Arial" panose="020B0604020202020204" pitchFamily="34" charset="0"/>
+              </a:rPr>
+              <a:t> </a:t>
+            </a:r>
+            <a:r>
+              <a:rPr lang="en-US" dirty="0" err="1">
+                <a:latin typeface="Arial" panose="020B0604020202020204" pitchFamily="34" charset="0"/>
+                <a:cs typeface="Arial" panose="020B0604020202020204" pitchFamily="34" charset="0"/>
+              </a:rPr>
+              <a:t>mục</a:t>
+            </a:r>
+            <a:r>
+              <a:rPr lang="en-US" dirty="0">
+                <a:latin typeface="Arial" panose="020B0604020202020204" pitchFamily="34" charset="0"/>
+                <a:cs typeface="Arial" panose="020B0604020202020204" pitchFamily="34" charset="0"/>
+              </a:rPr>
+              <a:t> </a:t>
+            </a:r>
+            <a:r>
+              <a:rPr lang="en-US" dirty="0" err="1">
+                <a:latin typeface="Arial" panose="020B0604020202020204" pitchFamily="34" charset="0"/>
+                <a:cs typeface="Arial" panose="020B0604020202020204" pitchFamily="34" charset="0"/>
+              </a:rPr>
+              <a:t>hiển</a:t>
+            </a:r>
+            <a:r>
+              <a:rPr lang="en-US" dirty="0">
+                <a:latin typeface="Arial" panose="020B0604020202020204" pitchFamily="34" charset="0"/>
+                <a:cs typeface="Arial" panose="020B0604020202020204" pitchFamily="34" charset="0"/>
+              </a:rPr>
+              <a:t> </a:t>
+            </a:r>
+            <a:r>
+              <a:rPr lang="en-US" dirty="0" err="1">
+                <a:latin typeface="Arial" panose="020B0604020202020204" pitchFamily="34" charset="0"/>
+                <a:cs typeface="Arial" panose="020B0604020202020204" pitchFamily="34" charset="0"/>
+              </a:rPr>
+              <a:t>thị</a:t>
+            </a:r>
+            <a:r>
+              <a:rPr lang="en-US" dirty="0">
+                <a:latin typeface="Arial" panose="020B0604020202020204" pitchFamily="34" charset="0"/>
+                <a:cs typeface="Arial" panose="020B0604020202020204" pitchFamily="34" charset="0"/>
+              </a:rPr>
+              <a:t> </a:t>
+            </a:r>
+            <a:r>
+              <a:rPr lang="en-US" dirty="0" err="1">
+                <a:latin typeface="Arial" panose="020B0604020202020204" pitchFamily="34" charset="0"/>
+                <a:cs typeface="Arial" panose="020B0604020202020204" pitchFamily="34" charset="0"/>
+              </a:rPr>
+              <a:t>đề</a:t>
+            </a:r>
+            <a:r>
+              <a:rPr lang="en-US" dirty="0">
+                <a:latin typeface="Arial" panose="020B0604020202020204" pitchFamily="34" charset="0"/>
+                <a:cs typeface="Arial" panose="020B0604020202020204" pitchFamily="34" charset="0"/>
+              </a:rPr>
+              <a:t> </a:t>
+            </a:r>
+            <a:r>
+              <a:rPr lang="en-US" dirty="0" err="1">
+                <a:latin typeface="Arial" panose="020B0604020202020204" pitchFamily="34" charset="0"/>
+                <a:cs typeface="Arial" panose="020B0604020202020204" pitchFamily="34" charset="0"/>
+              </a:rPr>
+              <a:t>xuất</a:t>
+            </a:r>
+            <a:r>
+              <a:rPr lang="en-US" dirty="0">
+                <a:latin typeface="Arial" panose="020B0604020202020204" pitchFamily="34" charset="0"/>
+                <a:cs typeface="Arial" panose="020B0604020202020204" pitchFamily="34" charset="0"/>
+              </a:rPr>
+              <a:t> </a:t>
+            </a:r>
+            <a:r>
+              <a:rPr lang="en-US" dirty="0" err="1">
+                <a:latin typeface="Arial" panose="020B0604020202020204" pitchFamily="34" charset="0"/>
+                <a:cs typeface="Arial" panose="020B0604020202020204" pitchFamily="34" charset="0"/>
+              </a:rPr>
+              <a:t>nhanh</a:t>
+            </a:r>
+            <a:r>
+              <a:rPr lang="en-US" dirty="0">
+                <a:latin typeface="Arial" panose="020B0604020202020204" pitchFamily="34" charset="0"/>
+                <a:cs typeface="Arial" panose="020B0604020202020204" pitchFamily="34" charset="0"/>
+              </a:rPr>
+              <a:t> </a:t>
+            </a:r>
+            <a:r>
+              <a:rPr lang="en-US" dirty="0" err="1">
+                <a:latin typeface="Arial" panose="020B0604020202020204" pitchFamily="34" charset="0"/>
+                <a:cs typeface="Arial" panose="020B0604020202020204" pitchFamily="34" charset="0"/>
+              </a:rPr>
+              <a:t>cho</a:t>
+            </a:r>
+            <a:r>
+              <a:rPr lang="en-US" dirty="0">
+                <a:latin typeface="Arial" panose="020B0604020202020204" pitchFamily="34" charset="0"/>
+                <a:cs typeface="Arial" panose="020B0604020202020204" pitchFamily="34" charset="0"/>
+              </a:rPr>
+              <a:t> </a:t>
+            </a:r>
+            <a:r>
+              <a:rPr lang="en-US" dirty="0" err="1">
+                <a:latin typeface="Arial" panose="020B0604020202020204" pitchFamily="34" charset="0"/>
+                <a:cs typeface="Arial" panose="020B0604020202020204" pitchFamily="34" charset="0"/>
+              </a:rPr>
+              <a:t>sự</a:t>
+            </a:r>
+            <a:r>
+              <a:rPr lang="en-US" dirty="0">
+                <a:latin typeface="Arial" panose="020B0604020202020204" pitchFamily="34" charset="0"/>
+                <a:cs typeface="Arial" panose="020B0604020202020204" pitchFamily="34" charset="0"/>
+              </a:rPr>
+              <a:t> </a:t>
+            </a:r>
+            <a:r>
+              <a:rPr lang="en-US" dirty="0" err="1">
+                <a:latin typeface="Arial" panose="020B0604020202020204" pitchFamily="34" charset="0"/>
+                <a:cs typeface="Arial" panose="020B0604020202020204" pitchFamily="34" charset="0"/>
+              </a:rPr>
+              <a:t>kiện</a:t>
+            </a:r>
+            <a:r>
+              <a:rPr lang="en-US" dirty="0">
+                <a:latin typeface="Arial" panose="020B0604020202020204" pitchFamily="34" charset="0"/>
+                <a:cs typeface="Arial" panose="020B0604020202020204" pitchFamily="34" charset="0"/>
+              </a:rPr>
+              <a:t> </a:t>
+            </a:r>
+            <a:r>
+              <a:rPr lang="en-US" dirty="0" err="1">
+                <a:latin typeface="Arial" panose="020B0604020202020204" pitchFamily="34" charset="0"/>
+                <a:cs typeface="Arial" panose="020B0604020202020204" pitchFamily="34" charset="0"/>
+              </a:rPr>
+              <a:t>sắp</a:t>
+            </a:r>
+            <a:r>
+              <a:rPr lang="en-US" dirty="0">
+                <a:latin typeface="Arial" panose="020B0604020202020204" pitchFamily="34" charset="0"/>
+                <a:cs typeface="Arial" panose="020B0604020202020204" pitchFamily="34" charset="0"/>
+              </a:rPr>
+              <a:t> </a:t>
+            </a:r>
+            <a:r>
+              <a:rPr lang="en-US" dirty="0" err="1">
+                <a:latin typeface="Arial" panose="020B0604020202020204" pitchFamily="34" charset="0"/>
+                <a:cs typeface="Arial" panose="020B0604020202020204" pitchFamily="34" charset="0"/>
+              </a:rPr>
+              <a:t>diễn</a:t>
+            </a:r>
+            <a:r>
+              <a:rPr lang="en-US" dirty="0">
+                <a:latin typeface="Arial" panose="020B0604020202020204" pitchFamily="34" charset="0"/>
+                <a:cs typeface="Arial" panose="020B0604020202020204" pitchFamily="34" charset="0"/>
+              </a:rPr>
+              <a:t> </a:t>
+            </a:r>
+            <a:r>
+              <a:rPr lang="en-US" dirty="0" err="1">
+                <a:latin typeface="Arial" panose="020B0604020202020204" pitchFamily="34" charset="0"/>
+                <a:cs typeface="Arial" panose="020B0604020202020204" pitchFamily="34" charset="0"/>
+              </a:rPr>
+              <a:t>ra</a:t>
+            </a:r>
+            <a:r>
+              <a:rPr lang="en-US" dirty="0">
+                <a:latin typeface="Arial" panose="020B0604020202020204" pitchFamily="34" charset="0"/>
+                <a:cs typeface="Arial" panose="020B0604020202020204" pitchFamily="34" charset="0"/>
+              </a:rPr>
+              <a:t> </a:t>
+            </a:r>
+          </a:p>
+          <a:p>
+            <a:pPr marL="285750" indent="-285750">
+              <a:buFont typeface="Arial" panose="020B0604020202020204" pitchFamily="34" charset="0"/>
+              <a:buChar char="•"/>
+            </a:pPr>
+            <a:endParaRPr lang="en-US" dirty="0">
+              <a:latin typeface="Arial" panose="020B0604020202020204" pitchFamily="34" charset="0"/>
+              <a:cs typeface="Arial" panose="020B0604020202020204" pitchFamily="34" charset="0"/>
+            </a:endParaRPr>
           </a:p>
         </p:txBody>
       </p:sp>
@@ -6032,16 +6272,12 @@
           <a:lstStyle/>
           <a:p>
             <a:r>
-              <a:rPr lang="en-US" dirty="0" smtClean="0">
+              <a:rPr lang="en-US" dirty="0">
                 <a:latin typeface="Times New Roman" panose="02020603050405020304" pitchFamily="18" charset="0"/>
                 <a:cs typeface="Times New Roman" panose="02020603050405020304" pitchFamily="18" charset="0"/>
               </a:rPr>
               <a:t>HỎI ĐÁP</a:t>
             </a:r>
-            <a:endParaRPr lang="en-US" dirty="0">
-              <a:latin typeface="Times New Roman" panose="02020603050405020304" pitchFamily="18" charset="0"/>
-              <a:cs typeface="Times New Roman" panose="02020603050405020304" pitchFamily="18" charset="0"/>
-            </a:endParaRPr>
           </a:p>
         </p:txBody>
       </p:sp>
@@ -6140,16 +6376,12 @@
           <a:lstStyle/>
           <a:p>
             <a:r>
-              <a:rPr lang="en-US" dirty="0" smtClean="0">
+              <a:rPr lang="en-US" dirty="0">
                 <a:latin typeface="Times New Roman" panose="02020603050405020304" pitchFamily="18" charset="0"/>
                 <a:cs typeface="Times New Roman" panose="02020603050405020304" pitchFamily="18" charset="0"/>
               </a:rPr>
               <a:t>NỘI DUNG</a:t>
             </a:r>
-            <a:endParaRPr lang="en-US" dirty="0">
-              <a:latin typeface="Times New Roman" panose="02020603050405020304" pitchFamily="18" charset="0"/>
-              <a:cs typeface="Times New Roman" panose="02020603050405020304" pitchFamily="18" charset="0"/>
-            </a:endParaRPr>
           </a:p>
         </p:txBody>
       </p:sp>
@@ -6169,69 +6401,39 @@
           <a:lstStyle/>
           <a:p>
             <a:r>
-              <a:rPr lang="en-US" dirty="0" smtClean="0">
+              <a:rPr lang="en-US" dirty="0">
                 <a:latin typeface="Times New Roman" panose="02020603050405020304" pitchFamily="18" charset="0"/>
                 <a:cs typeface="Times New Roman" panose="02020603050405020304" pitchFamily="18" charset="0"/>
               </a:rPr>
-              <a:t>GIỚI THIỆU DỰ </a:t>
-            </a:r>
-            <a:r>
-              <a:rPr lang="en-US" dirty="0" smtClean="0">
+              <a:t>GIỚI THIỆU DỰ ÁN VÀ ĐƯA RA PHƯƠNG ÁN</a:t>
+            </a:r>
+          </a:p>
+          <a:p>
+            <a:r>
+              <a:rPr lang="en-US" dirty="0">
                 <a:latin typeface="Times New Roman" panose="02020603050405020304" pitchFamily="18" charset="0"/>
                 <a:cs typeface="Times New Roman" panose="02020603050405020304" pitchFamily="18" charset="0"/>
               </a:rPr>
-              <a:t>ÁN VÀ ĐƯA RA PHƯƠNG ÁN</a:t>
-            </a:r>
-            <a:endParaRPr lang="en-US" dirty="0" smtClean="0">
-              <a:latin typeface="Times New Roman" panose="02020603050405020304" pitchFamily="18" charset="0"/>
-              <a:cs typeface="Times New Roman" panose="02020603050405020304" pitchFamily="18" charset="0"/>
-            </a:endParaRPr>
-          </a:p>
-          <a:p>
-            <a:r>
-              <a:rPr lang="en-US" dirty="0" smtClean="0">
+              <a:t>NỘI DUNG ĐÃ THỰC HIỆN VÀ KHÓ KHĂN</a:t>
+            </a:r>
+          </a:p>
+          <a:p>
+            <a:r>
+              <a:rPr lang="en-US" dirty="0">
                 <a:latin typeface="Times New Roman" panose="02020603050405020304" pitchFamily="18" charset="0"/>
                 <a:cs typeface="Times New Roman" panose="02020603050405020304" pitchFamily="18" charset="0"/>
               </a:rPr>
-              <a:t>NỘI DUNG </a:t>
-            </a:r>
-            <a:r>
-              <a:rPr lang="en-US" dirty="0" smtClean="0">
+              <a:t>SẢN PHẨM VÀ CÁC Ý TƯỞNG CẢI TIẾN</a:t>
+            </a:r>
+          </a:p>
+          <a:p>
+            <a:r>
+              <a:rPr lang="en-US" dirty="0">
                 <a:latin typeface="Times New Roman" panose="02020603050405020304" pitchFamily="18" charset="0"/>
                 <a:cs typeface="Times New Roman" panose="02020603050405020304" pitchFamily="18" charset="0"/>
               </a:rPr>
-              <a:t>ĐÃ THỰC HIỆN VÀ KHÓ KHĂN</a:t>
-            </a:r>
-            <a:endParaRPr lang="en-US" dirty="0" smtClean="0">
-              <a:latin typeface="Times New Roman" panose="02020603050405020304" pitchFamily="18" charset="0"/>
-              <a:cs typeface="Times New Roman" panose="02020603050405020304" pitchFamily="18" charset="0"/>
-            </a:endParaRPr>
-          </a:p>
-          <a:p>
-            <a:r>
-              <a:rPr lang="en-US" dirty="0" smtClean="0">
-                <a:latin typeface="Times New Roman" panose="02020603050405020304" pitchFamily="18" charset="0"/>
-                <a:cs typeface="Times New Roman" panose="02020603050405020304" pitchFamily="18" charset="0"/>
-              </a:rPr>
-              <a:t>SẢN PHẨM VÀ CÁC Ý TƯỞNG CẢI TIẾN</a:t>
-            </a:r>
-            <a:endParaRPr lang="en-US" dirty="0" smtClean="0">
-              <a:latin typeface="Times New Roman" panose="02020603050405020304" pitchFamily="18" charset="0"/>
-              <a:cs typeface="Times New Roman" panose="02020603050405020304" pitchFamily="18" charset="0"/>
-            </a:endParaRPr>
-          </a:p>
-          <a:p>
-            <a:r>
-              <a:rPr lang="en-US" dirty="0" smtClean="0">
-                <a:latin typeface="Times New Roman" panose="02020603050405020304" pitchFamily="18" charset="0"/>
-                <a:cs typeface="Times New Roman" panose="02020603050405020304" pitchFamily="18" charset="0"/>
-              </a:rPr>
               <a:t>Q&amp;A</a:t>
             </a:r>
-            <a:endParaRPr lang="en-US" dirty="0">
-              <a:latin typeface="Times New Roman" panose="02020603050405020304" pitchFamily="18" charset="0"/>
-              <a:cs typeface="Times New Roman" panose="02020603050405020304" pitchFamily="18" charset="0"/>
-            </a:endParaRPr>
           </a:p>
         </p:txBody>
       </p:sp>
@@ -6245,13 +6447,6 @@
   <p:clrMapOvr>
     <a:masterClrMapping/>
   </p:clrMapOvr>
-  <p:timing>
-    <p:tnLst>
-      <p:par>
-        <p:cTn id="1" dur="indefinite" restart="never" nodeType="tmRoot"/>
-      </p:par>
-    </p:tnLst>
-  </p:timing>
 </p:sld>
 </file>
 
@@ -6288,16 +6483,12 @@
           <a:lstStyle/>
           <a:p>
             <a:r>
-              <a:rPr lang="en-US" dirty="0" smtClean="0">
+              <a:rPr lang="en-US" dirty="0">
                 <a:latin typeface="Times New Roman" panose="02020603050405020304" pitchFamily="18" charset="0"/>
                 <a:cs typeface="Times New Roman" panose="02020603050405020304" pitchFamily="18" charset="0"/>
               </a:rPr>
               <a:t>GIỚI THIỆU</a:t>
             </a:r>
-            <a:endParaRPr lang="en-US" dirty="0">
-              <a:latin typeface="Times New Roman" panose="02020603050405020304" pitchFamily="18" charset="0"/>
-              <a:cs typeface="Times New Roman" panose="02020603050405020304" pitchFamily="18" charset="0"/>
-            </a:endParaRPr>
           </a:p>
         </p:txBody>
       </p:sp>
@@ -6366,16 +6557,12 @@
           <a:lstStyle/>
           <a:p>
             <a:r>
-              <a:rPr lang="en-US" dirty="0" smtClean="0">
+              <a:rPr lang="en-US" dirty="0">
                 <a:latin typeface="Times New Roman" panose="02020603050405020304" pitchFamily="18" charset="0"/>
                 <a:cs typeface="Times New Roman" panose="02020603050405020304" pitchFamily="18" charset="0"/>
               </a:rPr>
               <a:t>ĐẶT VẤN ĐỀ</a:t>
             </a:r>
-            <a:endParaRPr lang="en-US" dirty="0">
-              <a:latin typeface="Times New Roman" panose="02020603050405020304" pitchFamily="18" charset="0"/>
-              <a:cs typeface="Times New Roman" panose="02020603050405020304" pitchFamily="18" charset="0"/>
-            </a:endParaRPr>
           </a:p>
         </p:txBody>
       </p:sp>
@@ -6460,9 +6647,9 @@
           <a:p>
             <a:pPr algn="ctr"/>
             <a:r>
-              <a:rPr lang="en-US" sz="2000" b="1" dirty="0" err="1" smtClean="0">
-                <a:solidFill>
-                  <a:srgbClr val="FFFF00"/>
+              <a:rPr lang="en-US" sz="2000" b="1" dirty="0" err="1">
+                <a:solidFill>
+                  <a:schemeClr val="tx1"/>
                 </a:solidFill>
                 <a:latin typeface="Times New Roman" panose="02020603050405020304" pitchFamily="18" charset="0"/>
                 <a:cs typeface="Times New Roman" panose="02020603050405020304" pitchFamily="18" charset="0"/>
@@ -6470,9 +6657,9 @@
               <a:t>Bạn</a:t>
             </a:r>
             <a:r>
-              <a:rPr lang="en-US" sz="2000" b="1" dirty="0" smtClean="0">
-                <a:solidFill>
-                  <a:srgbClr val="FFFF00"/>
+              <a:rPr lang="en-US" sz="2000" b="1" dirty="0">
+                <a:solidFill>
+                  <a:schemeClr val="tx1"/>
                 </a:solidFill>
                 <a:latin typeface="Times New Roman" panose="02020603050405020304" pitchFamily="18" charset="0"/>
                 <a:cs typeface="Times New Roman" panose="02020603050405020304" pitchFamily="18" charset="0"/>
@@ -6480,9 +6667,9 @@
               <a:t> </a:t>
             </a:r>
             <a:r>
-              <a:rPr lang="en-US" sz="2000" b="1" dirty="0" err="1" smtClean="0">
-                <a:solidFill>
-                  <a:srgbClr val="FFFF00"/>
+              <a:rPr lang="en-US" sz="2000" b="1" dirty="0" err="1">
+                <a:solidFill>
+                  <a:schemeClr val="tx1"/>
                 </a:solidFill>
                 <a:latin typeface="Times New Roman" panose="02020603050405020304" pitchFamily="18" charset="0"/>
                 <a:cs typeface="Times New Roman" panose="02020603050405020304" pitchFamily="18" charset="0"/>
@@ -6490,9 +6677,9 @@
               <a:t>đã</a:t>
             </a:r>
             <a:r>
-              <a:rPr lang="en-US" sz="2000" b="1" dirty="0" smtClean="0">
-                <a:solidFill>
-                  <a:srgbClr val="FFFF00"/>
+              <a:rPr lang="en-US" sz="2000" b="1" dirty="0">
+                <a:solidFill>
+                  <a:schemeClr val="tx1"/>
                 </a:solidFill>
                 <a:latin typeface="Times New Roman" panose="02020603050405020304" pitchFamily="18" charset="0"/>
                 <a:cs typeface="Times New Roman" panose="02020603050405020304" pitchFamily="18" charset="0"/>
@@ -6500,9 +6687,9 @@
               <a:t> </a:t>
             </a:r>
             <a:r>
-              <a:rPr lang="en-US" sz="2000" b="1" dirty="0" err="1" smtClean="0">
-                <a:solidFill>
-                  <a:srgbClr val="FFFF00"/>
+              <a:rPr lang="en-US" sz="2000" b="1" dirty="0" err="1">
+                <a:solidFill>
+                  <a:schemeClr val="tx1"/>
                 </a:solidFill>
                 <a:latin typeface="Times New Roman" panose="02020603050405020304" pitchFamily="18" charset="0"/>
                 <a:cs typeface="Times New Roman" panose="02020603050405020304" pitchFamily="18" charset="0"/>
@@ -6510,9 +6697,9 @@
               <a:t>bao</a:t>
             </a:r>
             <a:r>
-              <a:rPr lang="en-US" sz="2000" b="1" dirty="0" smtClean="0">
-                <a:solidFill>
-                  <a:srgbClr val="FFFF00"/>
+              <a:rPr lang="en-US" sz="2000" b="1" dirty="0">
+                <a:solidFill>
+                  <a:schemeClr val="tx1"/>
                 </a:solidFill>
                 <a:latin typeface="Times New Roman" panose="02020603050405020304" pitchFamily="18" charset="0"/>
                 <a:cs typeface="Times New Roman" panose="02020603050405020304" pitchFamily="18" charset="0"/>
@@ -6520,9 +6707,9 @@
               <a:t> </a:t>
             </a:r>
             <a:r>
-              <a:rPr lang="en-US" sz="2000" b="1" dirty="0" err="1" smtClean="0">
-                <a:solidFill>
-                  <a:srgbClr val="FFFF00"/>
+              <a:rPr lang="en-US" sz="2000" b="1" dirty="0" err="1">
+                <a:solidFill>
+                  <a:schemeClr val="tx1"/>
                 </a:solidFill>
                 <a:latin typeface="Times New Roman" panose="02020603050405020304" pitchFamily="18" charset="0"/>
                 <a:cs typeface="Times New Roman" panose="02020603050405020304" pitchFamily="18" charset="0"/>
@@ -6530,9 +6717,9 @@
               <a:t>giờ</a:t>
             </a:r>
             <a:r>
-              <a:rPr lang="en-US" sz="2000" b="1" dirty="0" smtClean="0">
-                <a:solidFill>
-                  <a:srgbClr val="FFFF00"/>
+              <a:rPr lang="en-US" sz="2000" b="1" dirty="0">
+                <a:solidFill>
+                  <a:schemeClr val="tx1"/>
                 </a:solidFill>
                 <a:latin typeface="Times New Roman" panose="02020603050405020304" pitchFamily="18" charset="0"/>
                 <a:cs typeface="Times New Roman" panose="02020603050405020304" pitchFamily="18" charset="0"/>
@@ -6540,9 +6727,9 @@
               <a:t> </a:t>
             </a:r>
             <a:r>
-              <a:rPr lang="en-US" sz="2000" b="1" dirty="0" err="1" smtClean="0">
-                <a:solidFill>
-                  <a:srgbClr val="FFFF00"/>
+              <a:rPr lang="en-US" sz="2000" b="1" dirty="0" err="1">
+                <a:solidFill>
+                  <a:schemeClr val="tx1"/>
                 </a:solidFill>
                 <a:latin typeface="Times New Roman" panose="02020603050405020304" pitchFamily="18" charset="0"/>
                 <a:cs typeface="Times New Roman" panose="02020603050405020304" pitchFamily="18" charset="0"/>
@@ -6550,9 +6737,9 @@
               <a:t>gặp</a:t>
             </a:r>
             <a:r>
-              <a:rPr lang="en-US" sz="2000" b="1" dirty="0" smtClean="0">
-                <a:solidFill>
-                  <a:srgbClr val="FFFF00"/>
+              <a:rPr lang="en-US" sz="2000" b="1" dirty="0">
+                <a:solidFill>
+                  <a:schemeClr val="tx1"/>
                 </a:solidFill>
                 <a:latin typeface="Times New Roman" panose="02020603050405020304" pitchFamily="18" charset="0"/>
                 <a:cs typeface="Times New Roman" panose="02020603050405020304" pitchFamily="18" charset="0"/>
@@ -6560,9 +6747,9 @@
               <a:t> </a:t>
             </a:r>
             <a:r>
-              <a:rPr lang="en-US" sz="2000" b="1" dirty="0" err="1" smtClean="0">
-                <a:solidFill>
-                  <a:srgbClr val="FFFF00"/>
+              <a:rPr lang="en-US" sz="2000" b="1" dirty="0" err="1">
+                <a:solidFill>
+                  <a:schemeClr val="tx1"/>
                 </a:solidFill>
                 <a:latin typeface="Times New Roman" panose="02020603050405020304" pitchFamily="18" charset="0"/>
                 <a:cs typeface="Times New Roman" panose="02020603050405020304" pitchFamily="18" charset="0"/>
@@ -6570,9 +6757,9 @@
               <a:t>khó</a:t>
             </a:r>
             <a:r>
-              <a:rPr lang="en-US" sz="2000" b="1" dirty="0" smtClean="0">
-                <a:solidFill>
-                  <a:srgbClr val="FFFF00"/>
+              <a:rPr lang="en-US" sz="2000" b="1" dirty="0">
+                <a:solidFill>
+                  <a:schemeClr val="tx1"/>
                 </a:solidFill>
                 <a:latin typeface="Times New Roman" panose="02020603050405020304" pitchFamily="18" charset="0"/>
                 <a:cs typeface="Times New Roman" panose="02020603050405020304" pitchFamily="18" charset="0"/>
@@ -6580,9 +6767,9 @@
               <a:t> </a:t>
             </a:r>
             <a:r>
-              <a:rPr lang="en-US" sz="2000" b="1" dirty="0" err="1" smtClean="0">
-                <a:solidFill>
-                  <a:srgbClr val="FFFF00"/>
+              <a:rPr lang="en-US" sz="2000" b="1" dirty="0" err="1">
+                <a:solidFill>
+                  <a:schemeClr val="tx1"/>
                 </a:solidFill>
                 <a:latin typeface="Times New Roman" panose="02020603050405020304" pitchFamily="18" charset="0"/>
                 <a:cs typeface="Times New Roman" panose="02020603050405020304" pitchFamily="18" charset="0"/>
@@ -6590,9 +6777,9 @@
               <a:t>khăn</a:t>
             </a:r>
             <a:r>
-              <a:rPr lang="en-US" sz="2000" b="1" dirty="0" smtClean="0">
-                <a:solidFill>
-                  <a:srgbClr val="FFFF00"/>
+              <a:rPr lang="en-US" sz="2000" b="1" dirty="0">
+                <a:solidFill>
+                  <a:schemeClr val="tx1"/>
                 </a:solidFill>
                 <a:latin typeface="Times New Roman" panose="02020603050405020304" pitchFamily="18" charset="0"/>
                 <a:cs typeface="Times New Roman" panose="02020603050405020304" pitchFamily="18" charset="0"/>
@@ -6600,9 +6787,9 @@
               <a:t> </a:t>
             </a:r>
             <a:r>
-              <a:rPr lang="en-US" sz="2000" b="1" dirty="0" err="1" smtClean="0">
-                <a:solidFill>
-                  <a:srgbClr val="FFFF00"/>
+              <a:rPr lang="en-US" sz="2000" b="1" dirty="0" err="1">
+                <a:solidFill>
+                  <a:schemeClr val="tx1"/>
                 </a:solidFill>
                 <a:latin typeface="Times New Roman" panose="02020603050405020304" pitchFamily="18" charset="0"/>
                 <a:cs typeface="Times New Roman" panose="02020603050405020304" pitchFamily="18" charset="0"/>
@@ -6610,9 +6797,9 @@
               <a:t>khi</a:t>
             </a:r>
             <a:r>
-              <a:rPr lang="en-US" sz="2000" b="1" dirty="0" smtClean="0">
-                <a:solidFill>
-                  <a:srgbClr val="FFFF00"/>
+              <a:rPr lang="en-US" sz="2000" b="1" dirty="0">
+                <a:solidFill>
+                  <a:schemeClr val="tx1"/>
                 </a:solidFill>
                 <a:latin typeface="Times New Roman" panose="02020603050405020304" pitchFamily="18" charset="0"/>
                 <a:cs typeface="Times New Roman" panose="02020603050405020304" pitchFamily="18" charset="0"/>
@@ -6620,9 +6807,9 @@
               <a:t> </a:t>
             </a:r>
             <a:r>
-              <a:rPr lang="en-US" sz="2000" b="1" dirty="0" err="1" smtClean="0">
-                <a:solidFill>
-                  <a:srgbClr val="FFFF00"/>
+              <a:rPr lang="en-US" sz="2000" b="1" dirty="0" err="1">
+                <a:solidFill>
+                  <a:schemeClr val="tx1"/>
                 </a:solidFill>
                 <a:latin typeface="Times New Roman" panose="02020603050405020304" pitchFamily="18" charset="0"/>
                 <a:cs typeface="Times New Roman" panose="02020603050405020304" pitchFamily="18" charset="0"/>
@@ -6630,9 +6817,9 @@
               <a:t>tặng</a:t>
             </a:r>
             <a:r>
-              <a:rPr lang="en-US" sz="2000" b="1" dirty="0" smtClean="0">
-                <a:solidFill>
-                  <a:srgbClr val="FFFF00"/>
+              <a:rPr lang="en-US" sz="2000" b="1" dirty="0">
+                <a:solidFill>
+                  <a:schemeClr val="tx1"/>
                 </a:solidFill>
                 <a:latin typeface="Times New Roman" panose="02020603050405020304" pitchFamily="18" charset="0"/>
                 <a:cs typeface="Times New Roman" panose="02020603050405020304" pitchFamily="18" charset="0"/>
@@ -6640,9 +6827,9 @@
               <a:t> </a:t>
             </a:r>
             <a:r>
-              <a:rPr lang="en-US" sz="2000" b="1" dirty="0" err="1" smtClean="0">
-                <a:solidFill>
-                  <a:srgbClr val="FFFF00"/>
+              <a:rPr lang="en-US" sz="2000" b="1" dirty="0" err="1">
+                <a:solidFill>
+                  <a:schemeClr val="tx1"/>
                 </a:solidFill>
                 <a:latin typeface="Times New Roman" panose="02020603050405020304" pitchFamily="18" charset="0"/>
                 <a:cs typeface="Times New Roman" panose="02020603050405020304" pitchFamily="18" charset="0"/>
@@ -6650,9 +6837,9 @@
               <a:t>quà</a:t>
             </a:r>
             <a:r>
-              <a:rPr lang="en-US" sz="2000" b="1" dirty="0" smtClean="0">
-                <a:solidFill>
-                  <a:srgbClr val="FFFF00"/>
+              <a:rPr lang="en-US" sz="2000" b="1" dirty="0">
+                <a:solidFill>
+                  <a:schemeClr val="tx1"/>
                 </a:solidFill>
                 <a:latin typeface="Times New Roman" panose="02020603050405020304" pitchFamily="18" charset="0"/>
                 <a:cs typeface="Times New Roman" panose="02020603050405020304" pitchFamily="18" charset="0"/>
@@ -6660,9 +6847,9 @@
               <a:t> </a:t>
             </a:r>
             <a:r>
-              <a:rPr lang="en-US" sz="2000" b="1" dirty="0" err="1" smtClean="0">
-                <a:solidFill>
-                  <a:srgbClr val="FFFF00"/>
+              <a:rPr lang="en-US" sz="2000" b="1" dirty="0" err="1">
+                <a:solidFill>
+                  <a:schemeClr val="tx1"/>
                 </a:solidFill>
                 <a:latin typeface="Times New Roman" panose="02020603050405020304" pitchFamily="18" charset="0"/>
                 <a:cs typeface="Times New Roman" panose="02020603050405020304" pitchFamily="18" charset="0"/>
@@ -6670,9 +6857,9 @@
               <a:t>ai</a:t>
             </a:r>
             <a:r>
-              <a:rPr lang="en-US" sz="2000" b="1" dirty="0" smtClean="0">
-                <a:solidFill>
-                  <a:srgbClr val="FFFF00"/>
+              <a:rPr lang="en-US" sz="2000" b="1" dirty="0">
+                <a:solidFill>
+                  <a:schemeClr val="tx1"/>
                 </a:solidFill>
                 <a:latin typeface="Times New Roman" panose="02020603050405020304" pitchFamily="18" charset="0"/>
                 <a:cs typeface="Times New Roman" panose="02020603050405020304" pitchFamily="18" charset="0"/>
@@ -6680,9 +6867,9 @@
               <a:t> </a:t>
             </a:r>
             <a:r>
-              <a:rPr lang="en-US" sz="2000" b="1" dirty="0" err="1" smtClean="0">
-                <a:solidFill>
-                  <a:srgbClr val="FFFF00"/>
+              <a:rPr lang="en-US" sz="2000" b="1" dirty="0" err="1">
+                <a:solidFill>
+                  <a:schemeClr val="tx1"/>
                 </a:solidFill>
                 <a:latin typeface="Times New Roman" panose="02020603050405020304" pitchFamily="18" charset="0"/>
                 <a:cs typeface="Times New Roman" panose="02020603050405020304" pitchFamily="18" charset="0"/>
@@ -6690,9 +6877,9 @@
               <a:t>đó</a:t>
             </a:r>
             <a:r>
-              <a:rPr lang="en-US" sz="2000" b="1" dirty="0" smtClean="0">
-                <a:solidFill>
-                  <a:srgbClr val="FFFF00"/>
+              <a:rPr lang="en-US" sz="2000" b="1" dirty="0">
+                <a:solidFill>
+                  <a:schemeClr val="tx1"/>
                 </a:solidFill>
                 <a:latin typeface="Times New Roman" panose="02020603050405020304" pitchFamily="18" charset="0"/>
                 <a:cs typeface="Times New Roman" panose="02020603050405020304" pitchFamily="18" charset="0"/>
@@ -6700,9 +6887,9 @@
               <a:t> </a:t>
             </a:r>
             <a:r>
-              <a:rPr lang="en-US" sz="2000" b="1" dirty="0" err="1" smtClean="0">
-                <a:solidFill>
-                  <a:srgbClr val="FFFF00"/>
+              <a:rPr lang="en-US" sz="2000" b="1" dirty="0" err="1">
+                <a:solidFill>
+                  <a:schemeClr val="tx1"/>
                 </a:solidFill>
                 <a:latin typeface="Times New Roman" panose="02020603050405020304" pitchFamily="18" charset="0"/>
                 <a:cs typeface="Times New Roman" panose="02020603050405020304" pitchFamily="18" charset="0"/>
@@ -6710,22 +6897,15 @@
               <a:t>chưa</a:t>
             </a:r>
             <a:r>
-              <a:rPr lang="en-US" sz="2000" b="1" dirty="0" smtClean="0">
-                <a:solidFill>
-                  <a:srgbClr val="FFFF00"/>
+              <a:rPr lang="en-US" sz="2000" b="1" dirty="0">
+                <a:solidFill>
+                  <a:schemeClr val="tx1"/>
                 </a:solidFill>
                 <a:latin typeface="Times New Roman" panose="02020603050405020304" pitchFamily="18" charset="0"/>
                 <a:cs typeface="Times New Roman" panose="02020603050405020304" pitchFamily="18" charset="0"/>
               </a:rPr>
               <a:t>?</a:t>
             </a:r>
-            <a:endParaRPr lang="en-US" sz="2000" b="1" dirty="0">
-              <a:solidFill>
-                <a:srgbClr val="FFFF00"/>
-              </a:solidFill>
-              <a:latin typeface="Times New Roman" panose="02020603050405020304" pitchFamily="18" charset="0"/>
-              <a:cs typeface="Times New Roman" panose="02020603050405020304" pitchFamily="18" charset="0"/>
-            </a:endParaRPr>
           </a:p>
         </p:txBody>
       </p:sp>
@@ -6823,7 +7003,7 @@
           <a:lstStyle/>
           <a:p>
             <a:r>
-              <a:rPr lang="en-US" sz="3000" i="1" dirty="0" err="1" smtClean="0">
+              <a:rPr lang="en-US" sz="3000" i="1" dirty="0" err="1">
                 <a:solidFill>
                   <a:srgbClr val="34ED6C"/>
                 </a:solidFill>
@@ -6833,7 +7013,7 @@
               <a:t>Giải</a:t>
             </a:r>
             <a:r>
-              <a:rPr lang="en-US" sz="3000" i="1" dirty="0" smtClean="0">
+              <a:rPr lang="en-US" sz="3000" i="1" dirty="0">
                 <a:solidFill>
                   <a:srgbClr val="34ED6C"/>
                 </a:solidFill>
@@ -6843,7 +7023,7 @@
               <a:t> </a:t>
             </a:r>
             <a:r>
-              <a:rPr lang="en-US" sz="3000" i="1" dirty="0" err="1" smtClean="0">
+              <a:rPr lang="en-US" sz="3000" i="1" dirty="0" err="1">
                 <a:solidFill>
                   <a:srgbClr val="34ED6C"/>
                 </a:solidFill>
@@ -6853,7 +7033,7 @@
               <a:t>pháp</a:t>
             </a:r>
             <a:r>
-              <a:rPr lang="en-US" sz="3000" i="1" dirty="0" smtClean="0">
+              <a:rPr lang="en-US" sz="3000" i="1" dirty="0">
                 <a:solidFill>
                   <a:srgbClr val="34ED6C"/>
                 </a:solidFill>
@@ -6863,7 +7043,7 @@
               <a:t> </a:t>
             </a:r>
             <a:r>
-              <a:rPr lang="en-US" sz="3000" i="1" dirty="0" err="1" smtClean="0">
+              <a:rPr lang="en-US" sz="3000" i="1" dirty="0" err="1">
                 <a:solidFill>
                   <a:srgbClr val="34ED6C"/>
                 </a:solidFill>
@@ -6873,7 +7053,7 @@
               <a:t>dành</a:t>
             </a:r>
             <a:r>
-              <a:rPr lang="en-US" sz="3000" i="1" dirty="0" smtClean="0">
+              <a:rPr lang="en-US" sz="3000" i="1" dirty="0">
                 <a:solidFill>
                   <a:srgbClr val="34ED6C"/>
                 </a:solidFill>
@@ -6883,7 +7063,7 @@
               <a:t> </a:t>
             </a:r>
             <a:r>
-              <a:rPr lang="en-US" sz="3000" i="1" dirty="0" err="1" smtClean="0">
+              <a:rPr lang="en-US" sz="3000" i="1" dirty="0" err="1">
                 <a:solidFill>
                   <a:srgbClr val="34ED6C"/>
                 </a:solidFill>
@@ -6893,7 +7073,7 @@
               <a:t>cho</a:t>
             </a:r>
             <a:r>
-              <a:rPr lang="en-US" sz="3000" i="1" dirty="0" smtClean="0">
+              <a:rPr lang="en-US" sz="3000" i="1" dirty="0">
                 <a:solidFill>
                   <a:srgbClr val="34ED6C"/>
                 </a:solidFill>
@@ -6903,7 +7083,7 @@
               <a:t> </a:t>
             </a:r>
             <a:r>
-              <a:rPr lang="en-US" sz="3000" i="1" dirty="0" err="1" smtClean="0">
+              <a:rPr lang="en-US" sz="3000" i="1" dirty="0" err="1">
                 <a:solidFill>
                   <a:srgbClr val="34ED6C"/>
                 </a:solidFill>
@@ -6993,7 +7173,7 @@
               <a:buChar char="ü"/>
             </a:pPr>
             <a:r>
-              <a:rPr lang="en-US" sz="2800" b="1" dirty="0" smtClean="0">
+              <a:rPr lang="en-US" sz="2800" b="1" dirty="0">
                 <a:solidFill>
                   <a:srgbClr val="D1ED34"/>
                 </a:solidFill>
@@ -7003,7 +7183,7 @@
               <a:t> </a:t>
             </a:r>
             <a:r>
-              <a:rPr lang="en-US" sz="2800" b="1" dirty="0" err="1" smtClean="0">
+              <a:rPr lang="en-US" sz="2800" b="1" dirty="0" err="1">
                 <a:solidFill>
                   <a:srgbClr val="D1ED34"/>
                 </a:solidFill>
@@ -7013,7 +7193,7 @@
               <a:t>Nhanh</a:t>
             </a:r>
             <a:r>
-              <a:rPr lang="en-US" sz="2800" b="1" dirty="0" smtClean="0">
+              <a:rPr lang="en-US" sz="2800" b="1" dirty="0">
                 <a:solidFill>
                   <a:srgbClr val="D1ED34"/>
                 </a:solidFill>
@@ -7023,7 +7203,7 @@
               <a:t> </a:t>
             </a:r>
             <a:r>
-              <a:rPr lang="en-US" sz="2800" b="1" dirty="0" err="1" smtClean="0">
+              <a:rPr lang="en-US" sz="2800" b="1" dirty="0" err="1">
                 <a:solidFill>
                   <a:srgbClr val="D1ED34"/>
                 </a:solidFill>
@@ -7032,7 +7212,7 @@
               </a:rPr>
               <a:t>chóng</a:t>
             </a:r>
-            <a:endParaRPr lang="en-US" sz="2800" b="1" dirty="0" smtClean="0">
+            <a:endParaRPr lang="en-US" sz="2800" b="1" dirty="0">
               <a:solidFill>
                 <a:srgbClr val="D1ED34"/>
               </a:solidFill>
@@ -7049,7 +7229,7 @@
               <a:buChar char="ü"/>
             </a:pPr>
             <a:r>
-              <a:rPr lang="en-US" sz="2800" b="1" dirty="0" smtClean="0">
+              <a:rPr lang="en-US" sz="2800" b="1" dirty="0">
                 <a:solidFill>
                   <a:srgbClr val="D1ED34"/>
                 </a:solidFill>
@@ -7059,7 +7239,7 @@
               <a:t> </a:t>
             </a:r>
             <a:r>
-              <a:rPr lang="en-US" sz="2800" b="1" dirty="0" err="1" smtClean="0">
+              <a:rPr lang="en-US" sz="2800" b="1" dirty="0" err="1">
                 <a:solidFill>
                   <a:srgbClr val="D1ED34"/>
                 </a:solidFill>
@@ -7069,7 +7249,7 @@
               <a:t>Dễ</a:t>
             </a:r>
             <a:r>
-              <a:rPr lang="en-US" sz="2800" b="1" dirty="0" smtClean="0">
+              <a:rPr lang="en-US" sz="2800" b="1" dirty="0">
                 <a:solidFill>
                   <a:srgbClr val="D1ED34"/>
                 </a:solidFill>
@@ -7079,7 +7259,7 @@
               <a:t> </a:t>
             </a:r>
             <a:r>
-              <a:rPr lang="en-US" sz="2800" b="1" dirty="0" err="1" smtClean="0">
+              <a:rPr lang="en-US" sz="2800" b="1" dirty="0" err="1">
                 <a:solidFill>
                   <a:srgbClr val="D1ED34"/>
                 </a:solidFill>
@@ -7089,7 +7269,7 @@
               <a:t>sử</a:t>
             </a:r>
             <a:r>
-              <a:rPr lang="en-US" sz="2800" b="1" dirty="0" smtClean="0">
+              <a:rPr lang="en-US" sz="2800" b="1" dirty="0">
                 <a:solidFill>
                   <a:srgbClr val="D1ED34"/>
                 </a:solidFill>
@@ -7099,7 +7279,7 @@
               <a:t> </a:t>
             </a:r>
             <a:r>
-              <a:rPr lang="en-US" sz="2800" b="1" dirty="0" err="1" smtClean="0">
+              <a:rPr lang="en-US" sz="2800" b="1" dirty="0" err="1">
                 <a:solidFill>
                   <a:srgbClr val="D1ED34"/>
                 </a:solidFill>
@@ -7108,7 +7288,7 @@
               </a:rPr>
               <a:t>dụng</a:t>
             </a:r>
-            <a:endParaRPr lang="en-US" sz="2800" b="1" dirty="0" smtClean="0">
+            <a:endParaRPr lang="en-US" sz="2800" b="1" dirty="0">
               <a:solidFill>
                 <a:srgbClr val="D1ED34"/>
               </a:solidFill>
@@ -7125,7 +7305,7 @@
               <a:buChar char="ü"/>
             </a:pPr>
             <a:r>
-              <a:rPr lang="en-US" sz="2800" b="1" dirty="0" smtClean="0">
+              <a:rPr lang="en-US" sz="2800" b="1" dirty="0">
                 <a:solidFill>
                   <a:srgbClr val="D1ED34"/>
                 </a:solidFill>
@@ -7135,7 +7315,7 @@
               <a:t> </a:t>
             </a:r>
             <a:r>
-              <a:rPr lang="en-US" sz="2800" b="1" dirty="0" err="1" smtClean="0">
+              <a:rPr lang="en-US" sz="2800" b="1" dirty="0" err="1">
                 <a:solidFill>
                   <a:srgbClr val="D1ED34"/>
                 </a:solidFill>
@@ -7145,7 +7325,7 @@
               <a:t>Miễn</a:t>
             </a:r>
             <a:r>
-              <a:rPr lang="en-US" sz="2800" b="1" dirty="0" smtClean="0">
+              <a:rPr lang="en-US" sz="2800" b="1" dirty="0">
                 <a:solidFill>
                   <a:srgbClr val="D1ED34"/>
                 </a:solidFill>
@@ -7155,7 +7335,7 @@
               <a:t> </a:t>
             </a:r>
             <a:r>
-              <a:rPr lang="en-US" sz="2800" b="1" dirty="0" err="1" smtClean="0">
+              <a:rPr lang="en-US" sz="2800" b="1" dirty="0" err="1">
                 <a:solidFill>
                   <a:srgbClr val="D1ED34"/>
                 </a:solidFill>
@@ -7276,16 +7456,12 @@
           </a:lstStyle>
           <a:p>
             <a:r>
-              <a:rPr lang="en-US" dirty="0" smtClean="0">
+              <a:rPr lang="en-US" dirty="0">
                 <a:latin typeface="Times New Roman" panose="02020603050405020304" pitchFamily="18" charset="0"/>
                 <a:cs typeface="Times New Roman" panose="02020603050405020304" pitchFamily="18" charset="0"/>
               </a:rPr>
               <a:t>Ý TƯỞNG</a:t>
             </a:r>
-            <a:endParaRPr lang="en-US" dirty="0">
-              <a:latin typeface="Times New Roman" panose="02020603050405020304" pitchFamily="18" charset="0"/>
-              <a:cs typeface="Times New Roman" panose="02020603050405020304" pitchFamily="18" charset="0"/>
-            </a:endParaRPr>
           </a:p>
         </p:txBody>
       </p:sp>
@@ -7335,10 +7511,12 @@
           <a:lstStyle/>
           <a:p>
             <a:r>
-              <a:rPr lang="en-US" dirty="0" smtClean="0"/>
+              <a:rPr lang="en-US" dirty="0">
+                <a:latin typeface="Arial" panose="020B0604020202020204" pitchFamily="34" charset="0"/>
+                <a:cs typeface="Arial" panose="020B0604020202020204" pitchFamily="34" charset="0"/>
+              </a:rPr>
               <a:t>ĐƯA RA PHƯƠNG ÁN GIẢI QUYẾT</a:t>
             </a:r>
-            <a:endParaRPr lang="en-US" dirty="0"/>
           </a:p>
         </p:txBody>
       </p:sp>
@@ -7351,7 +7529,7 @@
         <p:spPr>
           <a:xfrm>
             <a:off x="1120462" y="2640169"/>
-            <a:ext cx="9994006" cy="1200329"/>
+            <a:ext cx="9994006" cy="1754326"/>
           </a:xfrm>
           <a:prstGeom prst="rect">
             <a:avLst/>
@@ -7369,7 +7547,10 @@
               <a:buChar char="•"/>
             </a:pPr>
             <a:r>
-              <a:rPr lang="en-US" dirty="0" smtClean="0"/>
+              <a:rPr lang="en-US" dirty="0">
+                <a:latin typeface="Arial" panose="020B0604020202020204" pitchFamily="34" charset="0"/>
+                <a:cs typeface="Arial" panose="020B0604020202020204" pitchFamily="34" charset="0"/>
+              </a:rPr>
               <a:t>CẦN CÓ MỘT NGUỒN THÔNG TIN PHONG PHÚ =&gt; KHẢO SÁT THU THẬP DỮ LIỆU VỀ SẢN PHẨM VÀ BỘ CÂU HỎI </a:t>
             </a:r>
           </a:p>
@@ -7378,10 +7559,10 @@
               <a:buFont typeface="Arial" panose="020B0604020202020204" pitchFamily="34" charset="0"/>
               <a:buChar char="•"/>
             </a:pPr>
-            <a:r>
-              <a:rPr lang="en-US" dirty="0" smtClean="0"/>
-              <a:t>NỘI DUNG HIỂN THỊ BẮT MẮT =&gt; TÌM KIẾM HÌNH ẢNH VÀ XỬ LÝ PHẦN GIAO DIỆN</a:t>
-            </a:r>
+            <a:endParaRPr lang="en-US" dirty="0">
+              <a:latin typeface="Arial" panose="020B0604020202020204" pitchFamily="34" charset="0"/>
+              <a:cs typeface="Arial" panose="020B0604020202020204" pitchFamily="34" charset="0"/>
+            </a:endParaRPr>
           </a:p>
           <a:p>
             <a:pPr marL="285750" indent="-285750">
@@ -7389,10 +7570,35 @@
               <a:buChar char="•"/>
             </a:pPr>
             <a:r>
-              <a:rPr lang="en-US" dirty="0" smtClean="0"/>
+              <a:rPr lang="en-US" dirty="0">
+                <a:latin typeface="Arial" panose="020B0604020202020204" pitchFamily="34" charset="0"/>
+                <a:cs typeface="Arial" panose="020B0604020202020204" pitchFamily="34" charset="0"/>
+              </a:rPr>
+              <a:t>NỘI DUNG HIỂN THỊ BẮT MẮT =&gt; TÌM KIẾM HÌNH ẢNH VÀ XỬ LÝ PHẦN GIAO DIỆN</a:t>
+            </a:r>
+          </a:p>
+          <a:p>
+            <a:pPr marL="285750" indent="-285750">
+              <a:buFont typeface="Arial" panose="020B0604020202020204" pitchFamily="34" charset="0"/>
+              <a:buChar char="•"/>
+            </a:pPr>
+            <a:endParaRPr lang="en-US" dirty="0">
+              <a:latin typeface="Arial" panose="020B0604020202020204" pitchFamily="34" charset="0"/>
+              <a:cs typeface="Arial" panose="020B0604020202020204" pitchFamily="34" charset="0"/>
+            </a:endParaRPr>
+          </a:p>
+          <a:p>
+            <a:pPr marL="285750" indent="-285750">
+              <a:buFont typeface="Arial" panose="020B0604020202020204" pitchFamily="34" charset="0"/>
+              <a:buChar char="•"/>
+            </a:pPr>
+            <a:r>
+              <a:rPr lang="en-US" dirty="0">
+                <a:latin typeface="Arial" panose="020B0604020202020204" pitchFamily="34" charset="0"/>
+                <a:cs typeface="Arial" panose="020B0604020202020204" pitchFamily="34" charset="0"/>
+              </a:rPr>
               <a:t>DỄ SỬ DỤNG VÀ PHÙ HỢP TRÊN MỌI THIẾT BỊ =&gt; XỬ LÝ JS VÀ TỐI ƯU TRÊN MOBILE </a:t>
             </a:r>
-            <a:endParaRPr lang="en-US" dirty="0"/>
           </a:p>
         </p:txBody>
       </p:sp>
@@ -7442,10 +7648,9 @@
           <a:lstStyle/>
           <a:p>
             <a:r>
-              <a:rPr lang="en-US" dirty="0" smtClean="0"/>
+              <a:rPr lang="en-US" dirty="0"/>
               <a:t>THÀNH VIÊN</a:t>
             </a:r>
-            <a:endParaRPr lang="en-US" dirty="0"/>
           </a:p>
         </p:txBody>
       </p:sp>
@@ -7676,7 +7881,7 @@
           <a:p>
             <a:pPr algn="ctr"/>
             <a:r>
-              <a:rPr lang="en-US" b="1" dirty="0" smtClean="0">
+              <a:rPr lang="en-US" b="1" dirty="0">
                 <a:latin typeface="Times New Roman" panose="02020603050405020304" pitchFamily="18" charset="0"/>
                 <a:cs typeface="Times New Roman" panose="02020603050405020304" pitchFamily="18" charset="0"/>
               </a:rPr>
@@ -7686,7 +7891,7 @@
           <a:p>
             <a:pPr algn="ctr"/>
             <a:r>
-              <a:rPr lang="en-US" dirty="0" smtClean="0">
+              <a:rPr lang="en-US" dirty="0">
                 <a:latin typeface="Times New Roman" panose="02020603050405020304" pitchFamily="18" charset="0"/>
                 <a:cs typeface="Times New Roman" panose="02020603050405020304" pitchFamily="18" charset="0"/>
               </a:rPr>
@@ -7703,16 +7908,12 @@
           <a:p>
             <a:pPr algn="ctr"/>
             <a:r>
-              <a:rPr lang="en-US" dirty="0" smtClean="0">
+              <a:rPr lang="en-US" dirty="0">
                 <a:latin typeface="Times New Roman" panose="02020603050405020304" pitchFamily="18" charset="0"/>
                 <a:cs typeface="Times New Roman" panose="02020603050405020304" pitchFamily="18" charset="0"/>
               </a:rPr>
               <a:t>PHỤ TRÁCH XỬ LÝ CHỨC NĂNG VÀ PHẦN JS</a:t>
             </a:r>
-            <a:endParaRPr lang="en-US" dirty="0">
-              <a:latin typeface="Times New Roman" panose="02020603050405020304" pitchFamily="18" charset="0"/>
-              <a:cs typeface="Times New Roman" panose="02020603050405020304" pitchFamily="18" charset="0"/>
-            </a:endParaRPr>
           </a:p>
         </p:txBody>
       </p:sp>
@@ -7753,7 +7954,7 @@
           <a:p>
             <a:pPr algn="ctr"/>
             <a:r>
-              <a:rPr lang="en-US" b="1" dirty="0" smtClean="0">
+              <a:rPr lang="en-US" b="1" dirty="0">
                 <a:latin typeface="Times New Roman" panose="02020603050405020304" pitchFamily="18" charset="0"/>
                 <a:cs typeface="Times New Roman" panose="02020603050405020304" pitchFamily="18" charset="0"/>
               </a:rPr>
@@ -7763,7 +7964,7 @@
           <a:p>
             <a:pPr algn="ctr"/>
             <a:r>
-              <a:rPr lang="en-US" dirty="0" smtClean="0">
+              <a:rPr lang="en-US" dirty="0">
                 <a:latin typeface="Times New Roman" panose="02020603050405020304" pitchFamily="18" charset="0"/>
                 <a:cs typeface="Times New Roman" panose="02020603050405020304" pitchFamily="18" charset="0"/>
               </a:rPr>
@@ -7780,16 +7981,12 @@
           <a:p>
             <a:pPr algn="ctr"/>
             <a:r>
-              <a:rPr lang="en-US" dirty="0" smtClean="0">
+              <a:rPr lang="en-US" dirty="0">
                 <a:latin typeface="Times New Roman" panose="02020603050405020304" pitchFamily="18" charset="0"/>
                 <a:cs typeface="Times New Roman" panose="02020603050405020304" pitchFamily="18" charset="0"/>
               </a:rPr>
               <a:t>PHỤ TRÁCH THU THẬP DATA VÀ HÌNH ẢNH</a:t>
             </a:r>
-            <a:endParaRPr lang="en-US" dirty="0">
-              <a:latin typeface="Times New Roman" panose="02020603050405020304" pitchFamily="18" charset="0"/>
-              <a:cs typeface="Times New Roman" panose="02020603050405020304" pitchFamily="18" charset="0"/>
-            </a:endParaRPr>
           </a:p>
         </p:txBody>
       </p:sp>
@@ -7830,7 +8027,7 @@
           <a:p>
             <a:pPr algn="ctr"/>
             <a:r>
-              <a:rPr lang="en-US" b="1" dirty="0" smtClean="0">
+              <a:rPr lang="en-US" b="1" dirty="0">
                 <a:latin typeface="Times New Roman" panose="02020603050405020304" pitchFamily="18" charset="0"/>
                 <a:cs typeface="Times New Roman" panose="02020603050405020304" pitchFamily="18" charset="0"/>
               </a:rPr>
@@ -7840,7 +8037,7 @@
           <a:p>
             <a:pPr algn="ctr"/>
             <a:r>
-              <a:rPr lang="en-US" dirty="0" smtClean="0">
+              <a:rPr lang="en-US" dirty="0">
                 <a:latin typeface="Times New Roman" panose="02020603050405020304" pitchFamily="18" charset="0"/>
                 <a:cs typeface="Times New Roman" panose="02020603050405020304" pitchFamily="18" charset="0"/>
               </a:rPr>
@@ -7857,16 +8054,12 @@
           <a:p>
             <a:pPr algn="ctr"/>
             <a:r>
-              <a:rPr lang="en-US" dirty="0" smtClean="0">
+              <a:rPr lang="en-US" dirty="0">
                 <a:latin typeface="Times New Roman" panose="02020603050405020304" pitchFamily="18" charset="0"/>
                 <a:cs typeface="Times New Roman" panose="02020603050405020304" pitchFamily="18" charset="0"/>
               </a:rPr>
               <a:t>PHỤ TRÁCH XỬ LÝ PHẦN GIAO DIỆN HTML VÀ CSS</a:t>
             </a:r>
-            <a:endParaRPr lang="en-US" dirty="0">
-              <a:latin typeface="Times New Roman" panose="02020603050405020304" pitchFamily="18" charset="0"/>
-              <a:cs typeface="Times New Roman" panose="02020603050405020304" pitchFamily="18" charset="0"/>
-            </a:endParaRPr>
           </a:p>
         </p:txBody>
       </p:sp>
@@ -7990,10 +8183,12 @@
           <a:lstStyle/>
           <a:p>
             <a:r>
-              <a:rPr lang="en-US" dirty="0" smtClean="0"/>
+              <a:rPr lang="en-US" dirty="0">
+                <a:latin typeface="Arial" panose="020B0604020202020204" pitchFamily="34" charset="0"/>
+                <a:cs typeface="Arial" panose="020B0604020202020204" pitchFamily="34" charset="0"/>
+              </a:rPr>
               <a:t>NỘI DUNG ĐÃ HOÀN THÀNH</a:t>
             </a:r>
-            <a:endParaRPr lang="en-US" dirty="0"/>
           </a:p>
         </p:txBody>
       </p:sp>
@@ -8006,7 +8201,7 @@
         <p:spPr>
           <a:xfrm>
             <a:off x="1223493" y="2691685"/>
-            <a:ext cx="8538693" cy="1477328"/>
+            <a:ext cx="8538693" cy="2031325"/>
           </a:xfrm>
           <a:prstGeom prst="rect">
             <a:avLst/>
@@ -8024,245 +8219,180 @@
               <a:buChar char="•"/>
             </a:pPr>
             <a:r>
-              <a:rPr lang="en-US" dirty="0" err="1" smtClean="0"/>
+              <a:rPr lang="en-US" dirty="0" err="1">
+                <a:latin typeface="Arial" panose="020B0604020202020204" pitchFamily="34" charset="0"/>
+                <a:cs typeface="Arial" panose="020B0604020202020204" pitchFamily="34" charset="0"/>
+              </a:rPr>
               <a:t>Cơ</a:t>
             </a:r>
             <a:r>
-              <a:rPr lang="en-US" dirty="0" smtClean="0"/>
-              <a:t> </a:t>
-            </a:r>
-            <a:r>
-              <a:rPr lang="en-US" dirty="0" err="1" smtClean="0"/>
+              <a:rPr lang="en-US" dirty="0">
+                <a:latin typeface="Arial" panose="020B0604020202020204" pitchFamily="34" charset="0"/>
+                <a:cs typeface="Arial" panose="020B0604020202020204" pitchFamily="34" charset="0"/>
+              </a:rPr>
+              <a:t> </a:t>
+            </a:r>
+            <a:r>
+              <a:rPr lang="en-US" dirty="0" err="1">
+                <a:latin typeface="Arial" panose="020B0604020202020204" pitchFamily="34" charset="0"/>
+                <a:cs typeface="Arial" panose="020B0604020202020204" pitchFamily="34" charset="0"/>
+              </a:rPr>
               <a:t>bản</a:t>
             </a:r>
             <a:r>
-              <a:rPr lang="en-US" dirty="0" smtClean="0"/>
-              <a:t> </a:t>
-            </a:r>
-            <a:r>
-              <a:rPr lang="en-US" dirty="0" err="1" smtClean="0"/>
+              <a:rPr lang="en-US" dirty="0">
+                <a:latin typeface="Arial" panose="020B0604020202020204" pitchFamily="34" charset="0"/>
+                <a:cs typeface="Arial" panose="020B0604020202020204" pitchFamily="34" charset="0"/>
+              </a:rPr>
+              <a:t> </a:t>
+            </a:r>
+            <a:r>
+              <a:rPr lang="en-US" dirty="0" err="1">
+                <a:latin typeface="Arial" panose="020B0604020202020204" pitchFamily="34" charset="0"/>
+                <a:cs typeface="Arial" panose="020B0604020202020204" pitchFamily="34" charset="0"/>
+              </a:rPr>
               <a:t>đã</a:t>
             </a:r>
             <a:r>
-              <a:rPr lang="en-US" dirty="0" smtClean="0"/>
-              <a:t> </a:t>
-            </a:r>
-            <a:r>
-              <a:rPr lang="en-US" dirty="0" err="1" smtClean="0"/>
+              <a:rPr lang="en-US" dirty="0">
+                <a:latin typeface="Arial" panose="020B0604020202020204" pitchFamily="34" charset="0"/>
+                <a:cs typeface="Arial" panose="020B0604020202020204" pitchFamily="34" charset="0"/>
+              </a:rPr>
+              <a:t> </a:t>
+            </a:r>
+            <a:r>
+              <a:rPr lang="en-US" dirty="0" err="1">
+                <a:latin typeface="Arial" panose="020B0604020202020204" pitchFamily="34" charset="0"/>
+                <a:cs typeface="Arial" panose="020B0604020202020204" pitchFamily="34" charset="0"/>
+              </a:rPr>
               <a:t>hoàn</a:t>
             </a:r>
             <a:r>
-              <a:rPr lang="en-US" dirty="0" smtClean="0"/>
-              <a:t> </a:t>
-            </a:r>
-            <a:r>
-              <a:rPr lang="en-US" dirty="0" err="1" smtClean="0"/>
+              <a:rPr lang="en-US" dirty="0">
+                <a:latin typeface="Arial" panose="020B0604020202020204" pitchFamily="34" charset="0"/>
+                <a:cs typeface="Arial" panose="020B0604020202020204" pitchFamily="34" charset="0"/>
+              </a:rPr>
+              <a:t> </a:t>
+            </a:r>
+            <a:r>
+              <a:rPr lang="en-US" dirty="0" err="1">
+                <a:latin typeface="Arial" panose="020B0604020202020204" pitchFamily="34" charset="0"/>
+                <a:cs typeface="Arial" panose="020B0604020202020204" pitchFamily="34" charset="0"/>
+              </a:rPr>
               <a:t>thiện</a:t>
             </a:r>
             <a:r>
-              <a:rPr lang="en-US" dirty="0" smtClean="0"/>
-              <a:t> </a:t>
-            </a:r>
-            <a:r>
-              <a:rPr lang="en-US" dirty="0" err="1" smtClean="0"/>
+              <a:rPr lang="en-US" dirty="0">
+                <a:latin typeface="Arial" panose="020B0604020202020204" pitchFamily="34" charset="0"/>
+                <a:cs typeface="Arial" panose="020B0604020202020204" pitchFamily="34" charset="0"/>
+              </a:rPr>
+              <a:t> </a:t>
+            </a:r>
+            <a:r>
+              <a:rPr lang="en-US" dirty="0" err="1">
+                <a:latin typeface="Arial" panose="020B0604020202020204" pitchFamily="34" charset="0"/>
+                <a:cs typeface="Arial" panose="020B0604020202020204" pitchFamily="34" charset="0"/>
+              </a:rPr>
               <a:t>được</a:t>
             </a:r>
             <a:r>
-              <a:rPr lang="en-US" dirty="0" smtClean="0"/>
-              <a:t> </a:t>
-            </a:r>
-            <a:r>
-              <a:rPr lang="en-US" dirty="0" err="1" smtClean="0"/>
+              <a:rPr lang="en-US" dirty="0">
+                <a:latin typeface="Arial" panose="020B0604020202020204" pitchFamily="34" charset="0"/>
+                <a:cs typeface="Arial" panose="020B0604020202020204" pitchFamily="34" charset="0"/>
+              </a:rPr>
+              <a:t> </a:t>
+            </a:r>
+            <a:r>
+              <a:rPr lang="en-US" dirty="0" err="1">
+                <a:latin typeface="Arial" panose="020B0604020202020204" pitchFamily="34" charset="0"/>
+                <a:cs typeface="Arial" panose="020B0604020202020204" pitchFamily="34" charset="0"/>
+              </a:rPr>
               <a:t>cách</a:t>
             </a:r>
             <a:r>
-              <a:rPr lang="en-US" dirty="0" smtClean="0"/>
-              <a:t> </a:t>
-            </a:r>
-            <a:r>
-              <a:rPr lang="en-US" dirty="0" err="1" smtClean="0"/>
+              <a:rPr lang="en-US" dirty="0">
+                <a:latin typeface="Arial" panose="020B0604020202020204" pitchFamily="34" charset="0"/>
+                <a:cs typeface="Arial" panose="020B0604020202020204" pitchFamily="34" charset="0"/>
+              </a:rPr>
+              <a:t> </a:t>
+            </a:r>
+            <a:r>
+              <a:rPr lang="en-US" dirty="0" err="1">
+                <a:latin typeface="Arial" panose="020B0604020202020204" pitchFamily="34" charset="0"/>
+                <a:cs typeface="Arial" panose="020B0604020202020204" pitchFamily="34" charset="0"/>
+              </a:rPr>
               <a:t>chức</a:t>
             </a:r>
             <a:r>
-              <a:rPr lang="en-US" dirty="0" smtClean="0"/>
-              <a:t> </a:t>
-            </a:r>
-            <a:r>
-              <a:rPr lang="en-US" dirty="0" err="1" smtClean="0"/>
+              <a:rPr lang="en-US" dirty="0">
+                <a:latin typeface="Arial" panose="020B0604020202020204" pitchFamily="34" charset="0"/>
+                <a:cs typeface="Arial" panose="020B0604020202020204" pitchFamily="34" charset="0"/>
+              </a:rPr>
+              <a:t> </a:t>
+            </a:r>
+            <a:r>
+              <a:rPr lang="en-US" dirty="0" err="1">
+                <a:latin typeface="Arial" panose="020B0604020202020204" pitchFamily="34" charset="0"/>
+                <a:cs typeface="Arial" panose="020B0604020202020204" pitchFamily="34" charset="0"/>
+              </a:rPr>
               <a:t>năng</a:t>
             </a:r>
             <a:r>
-              <a:rPr lang="en-US" dirty="0" smtClean="0"/>
-              <a:t> </a:t>
-            </a:r>
-            <a:r>
-              <a:rPr lang="en-US" dirty="0" err="1" smtClean="0"/>
+              <a:rPr lang="en-US" dirty="0">
+                <a:latin typeface="Arial" panose="020B0604020202020204" pitchFamily="34" charset="0"/>
+                <a:cs typeface="Arial" panose="020B0604020202020204" pitchFamily="34" charset="0"/>
+              </a:rPr>
+              <a:t> </a:t>
+            </a:r>
+            <a:r>
+              <a:rPr lang="en-US" dirty="0" err="1">
+                <a:latin typeface="Arial" panose="020B0604020202020204" pitchFamily="34" charset="0"/>
+                <a:cs typeface="Arial" panose="020B0604020202020204" pitchFamily="34" charset="0"/>
+              </a:rPr>
               <a:t>và</a:t>
             </a:r>
             <a:r>
-              <a:rPr lang="en-US" dirty="0" smtClean="0"/>
-              <a:t> </a:t>
-            </a:r>
-            <a:r>
-              <a:rPr lang="en-US" dirty="0" err="1" smtClean="0"/>
+              <a:rPr lang="en-US" dirty="0">
+                <a:latin typeface="Arial" panose="020B0604020202020204" pitchFamily="34" charset="0"/>
+                <a:cs typeface="Arial" panose="020B0604020202020204" pitchFamily="34" charset="0"/>
+              </a:rPr>
+              <a:t> </a:t>
+            </a:r>
+            <a:r>
+              <a:rPr lang="en-US" dirty="0" err="1">
+                <a:latin typeface="Arial" panose="020B0604020202020204" pitchFamily="34" charset="0"/>
+                <a:cs typeface="Arial" panose="020B0604020202020204" pitchFamily="34" charset="0"/>
+              </a:rPr>
               <a:t>giao</a:t>
             </a:r>
             <a:r>
-              <a:rPr lang="en-US" dirty="0" smtClean="0"/>
-              <a:t> </a:t>
-            </a:r>
-            <a:r>
-              <a:rPr lang="en-US" dirty="0" err="1" smtClean="0"/>
+              <a:rPr lang="en-US" dirty="0">
+                <a:latin typeface="Arial" panose="020B0604020202020204" pitchFamily="34" charset="0"/>
+                <a:cs typeface="Arial" panose="020B0604020202020204" pitchFamily="34" charset="0"/>
+              </a:rPr>
+              <a:t> </a:t>
+            </a:r>
+            <a:r>
+              <a:rPr lang="en-US" dirty="0" err="1">
+                <a:latin typeface="Arial" panose="020B0604020202020204" pitchFamily="34" charset="0"/>
+                <a:cs typeface="Arial" panose="020B0604020202020204" pitchFamily="34" charset="0"/>
+              </a:rPr>
               <a:t>diện</a:t>
             </a:r>
-            <a:endParaRPr lang="en-US" dirty="0" smtClean="0"/>
+            <a:endParaRPr lang="en-US" dirty="0">
+              <a:latin typeface="Arial" panose="020B0604020202020204" pitchFamily="34" charset="0"/>
+              <a:cs typeface="Arial" panose="020B0604020202020204" pitchFamily="34" charset="0"/>
+            </a:endParaRPr>
           </a:p>
           <a:p>
             <a:pPr marL="285750" indent="-285750">
               <a:buFont typeface="Arial" panose="020B0604020202020204" pitchFamily="34" charset="0"/>
               <a:buChar char="•"/>
             </a:pPr>
-            <a:r>
-              <a:rPr lang="en-US" dirty="0" err="1" smtClean="0"/>
-              <a:t>Bộ</a:t>
-            </a:r>
-            <a:r>
-              <a:rPr lang="en-US" dirty="0" smtClean="0"/>
-              <a:t> </a:t>
-            </a:r>
-            <a:r>
-              <a:rPr lang="en-US" dirty="0" err="1" smtClean="0"/>
-              <a:t>câu</a:t>
-            </a:r>
-            <a:r>
-              <a:rPr lang="en-US" dirty="0" smtClean="0"/>
-              <a:t> </a:t>
-            </a:r>
-            <a:r>
-              <a:rPr lang="en-US" dirty="0" err="1" smtClean="0"/>
-              <a:t>hỏi</a:t>
-            </a:r>
-            <a:r>
-              <a:rPr lang="en-US" dirty="0" smtClean="0"/>
-              <a:t> </a:t>
-            </a:r>
-            <a:r>
-              <a:rPr lang="en-US" dirty="0" err="1" smtClean="0"/>
-              <a:t>phân</a:t>
-            </a:r>
-            <a:r>
-              <a:rPr lang="en-US" dirty="0" smtClean="0"/>
-              <a:t> </a:t>
-            </a:r>
-            <a:r>
-              <a:rPr lang="en-US" dirty="0" err="1" smtClean="0"/>
-              <a:t>loại</a:t>
-            </a:r>
-            <a:r>
-              <a:rPr lang="en-US" dirty="0" smtClean="0"/>
-              <a:t> </a:t>
-            </a:r>
-            <a:r>
-              <a:rPr lang="en-US" dirty="0" err="1" smtClean="0"/>
-              <a:t>gồm</a:t>
-            </a:r>
-            <a:r>
-              <a:rPr lang="en-US" dirty="0" smtClean="0"/>
-              <a:t> 4 </a:t>
-            </a:r>
-            <a:r>
-              <a:rPr lang="en-US" dirty="0" err="1" smtClean="0"/>
-              <a:t>câu</a:t>
-            </a:r>
-            <a:r>
-              <a:rPr lang="en-US" dirty="0" smtClean="0"/>
-              <a:t> </a:t>
-            </a:r>
-            <a:r>
-              <a:rPr lang="en-US" dirty="0" err="1" smtClean="0"/>
-              <a:t>về</a:t>
-            </a:r>
-            <a:r>
-              <a:rPr lang="en-US" dirty="0" smtClean="0"/>
-              <a:t> </a:t>
-            </a:r>
-            <a:r>
-              <a:rPr lang="en-US" dirty="0" err="1" smtClean="0"/>
-              <a:t>giới</a:t>
-            </a:r>
-            <a:r>
-              <a:rPr lang="en-US" dirty="0" smtClean="0"/>
-              <a:t> </a:t>
-            </a:r>
-            <a:r>
-              <a:rPr lang="en-US" dirty="0" err="1" smtClean="0"/>
-              <a:t>tính</a:t>
-            </a:r>
-            <a:r>
-              <a:rPr lang="en-US" dirty="0" smtClean="0"/>
-              <a:t>, </a:t>
-            </a:r>
-            <a:r>
-              <a:rPr lang="en-US" dirty="0" err="1" smtClean="0"/>
-              <a:t>mối</a:t>
-            </a:r>
-            <a:r>
-              <a:rPr lang="en-US" dirty="0" smtClean="0"/>
-              <a:t> </a:t>
-            </a:r>
-            <a:r>
-              <a:rPr lang="en-US" dirty="0" err="1" smtClean="0"/>
-              <a:t>quan</a:t>
-            </a:r>
-            <a:r>
-              <a:rPr lang="en-US" dirty="0" smtClean="0"/>
-              <a:t> </a:t>
-            </a:r>
-            <a:r>
-              <a:rPr lang="en-US" dirty="0" err="1" smtClean="0"/>
-              <a:t>hệ</a:t>
-            </a:r>
-            <a:r>
-              <a:rPr lang="en-US" dirty="0" smtClean="0"/>
-              <a:t>, </a:t>
-            </a:r>
-            <a:r>
-              <a:rPr lang="en-US" dirty="0" err="1" smtClean="0"/>
-              <a:t>sự</a:t>
-            </a:r>
-            <a:r>
-              <a:rPr lang="en-US" dirty="0" smtClean="0"/>
-              <a:t> </a:t>
-            </a:r>
-            <a:r>
-              <a:rPr lang="en-US" dirty="0" err="1" smtClean="0"/>
-              <a:t>kiện</a:t>
-            </a:r>
-            <a:r>
-              <a:rPr lang="en-US" dirty="0" smtClean="0"/>
-              <a:t> </a:t>
-            </a:r>
-            <a:r>
-              <a:rPr lang="en-US" dirty="0" err="1" smtClean="0"/>
-              <a:t>và</a:t>
-            </a:r>
-            <a:r>
-              <a:rPr lang="en-US" dirty="0" smtClean="0"/>
-              <a:t> </a:t>
-            </a:r>
-            <a:r>
-              <a:rPr lang="en-US" dirty="0" err="1" smtClean="0"/>
-              <a:t>giá</a:t>
-            </a:r>
-            <a:r>
-              <a:rPr lang="en-US" dirty="0" smtClean="0"/>
-              <a:t> </a:t>
-            </a:r>
-            <a:r>
-              <a:rPr lang="en-US" dirty="0" err="1" smtClean="0"/>
-              <a:t>cả</a:t>
-            </a:r>
-            <a:endParaRPr lang="en-US" dirty="0" smtClean="0"/>
+            <a:endParaRPr lang="en-US" dirty="0">
+              <a:latin typeface="Arial" panose="020B0604020202020204" pitchFamily="34" charset="0"/>
+              <a:cs typeface="Arial" panose="020B0604020202020204" pitchFamily="34" charset="0"/>
+            </a:endParaRPr>
           </a:p>
           <a:p>
             <a:pPr marL="285750" indent="-285750">
@@ -8270,123 +8400,472 @@
               <a:buChar char="•"/>
             </a:pPr>
             <a:r>
-              <a:rPr lang="en-US" dirty="0" err="1" smtClean="0"/>
-              <a:t>Đã</a:t>
-            </a:r>
-            <a:r>
-              <a:rPr lang="en-US" dirty="0" smtClean="0"/>
-              <a:t> </a:t>
-            </a:r>
-            <a:r>
-              <a:rPr lang="en-US" dirty="0" err="1" smtClean="0"/>
-              <a:t>hiển</a:t>
-            </a:r>
-            <a:r>
-              <a:rPr lang="en-US" dirty="0" smtClean="0"/>
-              <a:t> </a:t>
-            </a:r>
-            <a:r>
-              <a:rPr lang="en-US" dirty="0" err="1" smtClean="0"/>
-              <a:t>thị</a:t>
-            </a:r>
-            <a:r>
-              <a:rPr lang="en-US" dirty="0"/>
-              <a:t> </a:t>
-            </a:r>
-            <a:r>
-              <a:rPr lang="en-US" dirty="0" err="1" smtClean="0"/>
-              <a:t>tốt</a:t>
-            </a:r>
-            <a:r>
-              <a:rPr lang="en-US" dirty="0" smtClean="0"/>
-              <a:t> </a:t>
-            </a:r>
-            <a:r>
-              <a:rPr lang="en-US" dirty="0" err="1" smtClean="0"/>
-              <a:t>trên</a:t>
-            </a:r>
-            <a:r>
-              <a:rPr lang="en-US" dirty="0" smtClean="0"/>
-              <a:t> </a:t>
-            </a:r>
-            <a:r>
-              <a:rPr lang="en-US" dirty="0" err="1" smtClean="0"/>
-              <a:t>hai</a:t>
-            </a:r>
-            <a:r>
-              <a:rPr lang="en-US" dirty="0" smtClean="0"/>
-              <a:t> </a:t>
-            </a:r>
-            <a:r>
-              <a:rPr lang="en-US" dirty="0" err="1" smtClean="0"/>
-              <a:t>thiết</a:t>
-            </a:r>
-            <a:r>
-              <a:rPr lang="en-US" dirty="0" smtClean="0"/>
-              <a:t> </a:t>
-            </a:r>
-            <a:r>
-              <a:rPr lang="en-US" dirty="0" err="1" smtClean="0"/>
-              <a:t>bị</a:t>
-            </a:r>
-            <a:r>
-              <a:rPr lang="en-US" dirty="0" smtClean="0"/>
-              <a:t> </a:t>
-            </a:r>
-            <a:r>
-              <a:rPr lang="en-US" dirty="0" err="1" smtClean="0"/>
-              <a:t>chính</a:t>
-            </a:r>
-            <a:r>
-              <a:rPr lang="en-US" dirty="0" smtClean="0"/>
-              <a:t> </a:t>
-            </a:r>
-            <a:r>
-              <a:rPr lang="en-US" dirty="0" err="1" smtClean="0"/>
-              <a:t>là</a:t>
-            </a:r>
-            <a:r>
-              <a:rPr lang="en-US" dirty="0" smtClean="0"/>
-              <a:t> </a:t>
-            </a:r>
-            <a:r>
-              <a:rPr lang="en-US" dirty="0" err="1" smtClean="0"/>
-              <a:t>máy</a:t>
-            </a:r>
-            <a:r>
-              <a:rPr lang="en-US" dirty="0" smtClean="0"/>
-              <a:t> </a:t>
-            </a:r>
-            <a:r>
-              <a:rPr lang="en-US" dirty="0" err="1" smtClean="0"/>
+              <a:rPr lang="en-US" dirty="0" err="1">
+                <a:latin typeface="Arial" panose="020B0604020202020204" pitchFamily="34" charset="0"/>
+                <a:cs typeface="Arial" panose="020B0604020202020204" pitchFamily="34" charset="0"/>
+              </a:rPr>
+              <a:t>Bộ</a:t>
+            </a:r>
+            <a:r>
+              <a:rPr lang="en-US" dirty="0">
+                <a:latin typeface="Arial" panose="020B0604020202020204" pitchFamily="34" charset="0"/>
+                <a:cs typeface="Arial" panose="020B0604020202020204" pitchFamily="34" charset="0"/>
+              </a:rPr>
+              <a:t> </a:t>
+            </a:r>
+            <a:r>
+              <a:rPr lang="en-US" dirty="0" err="1">
+                <a:latin typeface="Arial" panose="020B0604020202020204" pitchFamily="34" charset="0"/>
+                <a:cs typeface="Arial" panose="020B0604020202020204" pitchFamily="34" charset="0"/>
+              </a:rPr>
+              <a:t>câu</a:t>
+            </a:r>
+            <a:r>
+              <a:rPr lang="en-US" dirty="0">
+                <a:latin typeface="Arial" panose="020B0604020202020204" pitchFamily="34" charset="0"/>
+                <a:cs typeface="Arial" panose="020B0604020202020204" pitchFamily="34" charset="0"/>
+              </a:rPr>
+              <a:t> </a:t>
+            </a:r>
+            <a:r>
+              <a:rPr lang="en-US" dirty="0" err="1">
+                <a:latin typeface="Arial" panose="020B0604020202020204" pitchFamily="34" charset="0"/>
+                <a:cs typeface="Arial" panose="020B0604020202020204" pitchFamily="34" charset="0"/>
+              </a:rPr>
+              <a:t>hỏi</a:t>
+            </a:r>
+            <a:r>
+              <a:rPr lang="en-US" dirty="0">
+                <a:latin typeface="Arial" panose="020B0604020202020204" pitchFamily="34" charset="0"/>
+                <a:cs typeface="Arial" panose="020B0604020202020204" pitchFamily="34" charset="0"/>
+              </a:rPr>
+              <a:t> </a:t>
+            </a:r>
+            <a:r>
+              <a:rPr lang="en-US" dirty="0" err="1">
+                <a:latin typeface="Arial" panose="020B0604020202020204" pitchFamily="34" charset="0"/>
+                <a:cs typeface="Arial" panose="020B0604020202020204" pitchFamily="34" charset="0"/>
+              </a:rPr>
+              <a:t>phân</a:t>
+            </a:r>
+            <a:r>
+              <a:rPr lang="en-US" dirty="0">
+                <a:latin typeface="Arial" panose="020B0604020202020204" pitchFamily="34" charset="0"/>
+                <a:cs typeface="Arial" panose="020B0604020202020204" pitchFamily="34" charset="0"/>
+              </a:rPr>
+              <a:t> </a:t>
+            </a:r>
+            <a:r>
+              <a:rPr lang="en-US" dirty="0" err="1">
+                <a:latin typeface="Arial" panose="020B0604020202020204" pitchFamily="34" charset="0"/>
+                <a:cs typeface="Arial" panose="020B0604020202020204" pitchFamily="34" charset="0"/>
+              </a:rPr>
+              <a:t>loại</a:t>
+            </a:r>
+            <a:r>
+              <a:rPr lang="en-US" dirty="0">
+                <a:latin typeface="Arial" panose="020B0604020202020204" pitchFamily="34" charset="0"/>
+                <a:cs typeface="Arial" panose="020B0604020202020204" pitchFamily="34" charset="0"/>
+              </a:rPr>
+              <a:t> </a:t>
+            </a:r>
+            <a:r>
+              <a:rPr lang="en-US" dirty="0" err="1">
+                <a:latin typeface="Arial" panose="020B0604020202020204" pitchFamily="34" charset="0"/>
+                <a:cs typeface="Arial" panose="020B0604020202020204" pitchFamily="34" charset="0"/>
+              </a:rPr>
+              <a:t>gồm</a:t>
+            </a:r>
+            <a:r>
+              <a:rPr lang="en-US" dirty="0">
+                <a:latin typeface="Arial" panose="020B0604020202020204" pitchFamily="34" charset="0"/>
+                <a:cs typeface="Arial" panose="020B0604020202020204" pitchFamily="34" charset="0"/>
+              </a:rPr>
+              <a:t> 4 </a:t>
+            </a:r>
+            <a:r>
+              <a:rPr lang="en-US" dirty="0" err="1">
+                <a:latin typeface="Arial" panose="020B0604020202020204" pitchFamily="34" charset="0"/>
+                <a:cs typeface="Arial" panose="020B0604020202020204" pitchFamily="34" charset="0"/>
+              </a:rPr>
+              <a:t>câu</a:t>
+            </a:r>
+            <a:r>
+              <a:rPr lang="en-US" dirty="0">
+                <a:latin typeface="Arial" panose="020B0604020202020204" pitchFamily="34" charset="0"/>
+                <a:cs typeface="Arial" panose="020B0604020202020204" pitchFamily="34" charset="0"/>
+              </a:rPr>
+              <a:t> </a:t>
+            </a:r>
+            <a:r>
+              <a:rPr lang="en-US" dirty="0" err="1">
+                <a:latin typeface="Arial" panose="020B0604020202020204" pitchFamily="34" charset="0"/>
+                <a:cs typeface="Arial" panose="020B0604020202020204" pitchFamily="34" charset="0"/>
+              </a:rPr>
+              <a:t>về</a:t>
+            </a:r>
+            <a:r>
+              <a:rPr lang="en-US" dirty="0">
+                <a:latin typeface="Arial" panose="020B0604020202020204" pitchFamily="34" charset="0"/>
+                <a:cs typeface="Arial" panose="020B0604020202020204" pitchFamily="34" charset="0"/>
+              </a:rPr>
+              <a:t> </a:t>
+            </a:r>
+            <a:r>
+              <a:rPr lang="en-US" dirty="0" err="1">
+                <a:latin typeface="Arial" panose="020B0604020202020204" pitchFamily="34" charset="0"/>
+                <a:cs typeface="Arial" panose="020B0604020202020204" pitchFamily="34" charset="0"/>
+              </a:rPr>
+              <a:t>giới</a:t>
+            </a:r>
+            <a:r>
+              <a:rPr lang="en-US" dirty="0">
+                <a:latin typeface="Arial" panose="020B0604020202020204" pitchFamily="34" charset="0"/>
+                <a:cs typeface="Arial" panose="020B0604020202020204" pitchFamily="34" charset="0"/>
+              </a:rPr>
+              <a:t> </a:t>
+            </a:r>
+            <a:r>
+              <a:rPr lang="en-US" dirty="0" err="1">
+                <a:latin typeface="Arial" panose="020B0604020202020204" pitchFamily="34" charset="0"/>
+                <a:cs typeface="Arial" panose="020B0604020202020204" pitchFamily="34" charset="0"/>
+              </a:rPr>
               <a:t>tính</a:t>
             </a:r>
             <a:r>
-              <a:rPr lang="en-US" dirty="0" smtClean="0"/>
-              <a:t> </a:t>
-            </a:r>
-            <a:r>
-              <a:rPr lang="en-US" dirty="0" err="1" smtClean="0"/>
+              <a:rPr lang="en-US" dirty="0">
+                <a:latin typeface="Arial" panose="020B0604020202020204" pitchFamily="34" charset="0"/>
+                <a:cs typeface="Arial" panose="020B0604020202020204" pitchFamily="34" charset="0"/>
+              </a:rPr>
+              <a:t>, </a:t>
+            </a:r>
+            <a:r>
+              <a:rPr lang="en-US" dirty="0" err="1">
+                <a:latin typeface="Arial" panose="020B0604020202020204" pitchFamily="34" charset="0"/>
+                <a:cs typeface="Arial" panose="020B0604020202020204" pitchFamily="34" charset="0"/>
+              </a:rPr>
+              <a:t>mối</a:t>
+            </a:r>
+            <a:r>
+              <a:rPr lang="en-US" dirty="0">
+                <a:latin typeface="Arial" panose="020B0604020202020204" pitchFamily="34" charset="0"/>
+                <a:cs typeface="Arial" panose="020B0604020202020204" pitchFamily="34" charset="0"/>
+              </a:rPr>
+              <a:t> </a:t>
+            </a:r>
+            <a:r>
+              <a:rPr lang="en-US" dirty="0" err="1">
+                <a:latin typeface="Arial" panose="020B0604020202020204" pitchFamily="34" charset="0"/>
+                <a:cs typeface="Arial" panose="020B0604020202020204" pitchFamily="34" charset="0"/>
+              </a:rPr>
+              <a:t>quan</a:t>
+            </a:r>
+            <a:r>
+              <a:rPr lang="en-US" dirty="0">
+                <a:latin typeface="Arial" panose="020B0604020202020204" pitchFamily="34" charset="0"/>
+                <a:cs typeface="Arial" panose="020B0604020202020204" pitchFamily="34" charset="0"/>
+              </a:rPr>
+              <a:t> </a:t>
+            </a:r>
+            <a:r>
+              <a:rPr lang="en-US" dirty="0" err="1">
+                <a:latin typeface="Arial" panose="020B0604020202020204" pitchFamily="34" charset="0"/>
+                <a:cs typeface="Arial" panose="020B0604020202020204" pitchFamily="34" charset="0"/>
+              </a:rPr>
+              <a:t>hệ</a:t>
+            </a:r>
+            <a:r>
+              <a:rPr lang="en-US" dirty="0">
+                <a:latin typeface="Arial" panose="020B0604020202020204" pitchFamily="34" charset="0"/>
+                <a:cs typeface="Arial" panose="020B0604020202020204" pitchFamily="34" charset="0"/>
+              </a:rPr>
+              <a:t>, </a:t>
+            </a:r>
+            <a:r>
+              <a:rPr lang="en-US" dirty="0" err="1">
+                <a:latin typeface="Arial" panose="020B0604020202020204" pitchFamily="34" charset="0"/>
+                <a:cs typeface="Arial" panose="020B0604020202020204" pitchFamily="34" charset="0"/>
+              </a:rPr>
+              <a:t>sự</a:t>
+            </a:r>
+            <a:r>
+              <a:rPr lang="en-US" dirty="0">
+                <a:latin typeface="Arial" panose="020B0604020202020204" pitchFamily="34" charset="0"/>
+                <a:cs typeface="Arial" panose="020B0604020202020204" pitchFamily="34" charset="0"/>
+              </a:rPr>
+              <a:t> </a:t>
+            </a:r>
+            <a:r>
+              <a:rPr lang="en-US" dirty="0" err="1">
+                <a:latin typeface="Arial" panose="020B0604020202020204" pitchFamily="34" charset="0"/>
+                <a:cs typeface="Arial" panose="020B0604020202020204" pitchFamily="34" charset="0"/>
+              </a:rPr>
+              <a:t>kiện</a:t>
+            </a:r>
+            <a:r>
+              <a:rPr lang="en-US" dirty="0">
+                <a:latin typeface="Arial" panose="020B0604020202020204" pitchFamily="34" charset="0"/>
+                <a:cs typeface="Arial" panose="020B0604020202020204" pitchFamily="34" charset="0"/>
+              </a:rPr>
+              <a:t> </a:t>
+            </a:r>
+            <a:r>
+              <a:rPr lang="en-US" dirty="0" err="1">
+                <a:latin typeface="Arial" panose="020B0604020202020204" pitchFamily="34" charset="0"/>
+                <a:cs typeface="Arial" panose="020B0604020202020204" pitchFamily="34" charset="0"/>
+              </a:rPr>
               <a:t>và</a:t>
             </a:r>
             <a:r>
-              <a:rPr lang="en-US" dirty="0" smtClean="0"/>
-              <a:t> mobile</a:t>
-            </a:r>
+              <a:rPr lang="en-US" dirty="0">
+                <a:latin typeface="Arial" panose="020B0604020202020204" pitchFamily="34" charset="0"/>
+                <a:cs typeface="Arial" panose="020B0604020202020204" pitchFamily="34" charset="0"/>
+              </a:rPr>
+              <a:t> </a:t>
+            </a:r>
+            <a:r>
+              <a:rPr lang="en-US" dirty="0" err="1">
+                <a:latin typeface="Arial" panose="020B0604020202020204" pitchFamily="34" charset="0"/>
+                <a:cs typeface="Arial" panose="020B0604020202020204" pitchFamily="34" charset="0"/>
+              </a:rPr>
+              <a:t>giá</a:t>
+            </a:r>
+            <a:r>
+              <a:rPr lang="en-US" dirty="0">
+                <a:latin typeface="Arial" panose="020B0604020202020204" pitchFamily="34" charset="0"/>
+                <a:cs typeface="Arial" panose="020B0604020202020204" pitchFamily="34" charset="0"/>
+              </a:rPr>
+              <a:t> </a:t>
+            </a:r>
+            <a:r>
+              <a:rPr lang="en-US" dirty="0" err="1">
+                <a:latin typeface="Arial" panose="020B0604020202020204" pitchFamily="34" charset="0"/>
+                <a:cs typeface="Arial" panose="020B0604020202020204" pitchFamily="34" charset="0"/>
+              </a:rPr>
+              <a:t>cả</a:t>
+            </a:r>
+            <a:endParaRPr lang="en-US" dirty="0">
+              <a:latin typeface="Arial" panose="020B0604020202020204" pitchFamily="34" charset="0"/>
+              <a:cs typeface="Arial" panose="020B0604020202020204" pitchFamily="34" charset="0"/>
+            </a:endParaRPr>
           </a:p>
           <a:p>
             <a:pPr marL="285750" indent="-285750">
               <a:buFont typeface="Arial" panose="020B0604020202020204" pitchFamily="34" charset="0"/>
               <a:buChar char="•"/>
             </a:pPr>
-            <a:endParaRPr lang="en-US" dirty="0"/>
+            <a:endParaRPr lang="en-US" dirty="0">
+              <a:latin typeface="Arial" panose="020B0604020202020204" pitchFamily="34" charset="0"/>
+              <a:cs typeface="Arial" panose="020B0604020202020204" pitchFamily="34" charset="0"/>
+            </a:endParaRPr>
           </a:p>
           <a:p>
             <a:pPr marL="285750" indent="-285750">
               <a:buFont typeface="Arial" panose="020B0604020202020204" pitchFamily="34" charset="0"/>
               <a:buChar char="•"/>
             </a:pPr>
-            <a:endParaRPr lang="en-US" dirty="0"/>
+            <a:r>
+              <a:rPr lang="en-US" dirty="0" err="1">
+                <a:latin typeface="Arial" panose="020B0604020202020204" pitchFamily="34" charset="0"/>
+                <a:cs typeface="Arial" panose="020B0604020202020204" pitchFamily="34" charset="0"/>
+              </a:rPr>
+              <a:t>Đã</a:t>
+            </a:r>
+            <a:r>
+              <a:rPr lang="en-US" dirty="0">
+                <a:latin typeface="Arial" panose="020B0604020202020204" pitchFamily="34" charset="0"/>
+                <a:cs typeface="Arial" panose="020B0604020202020204" pitchFamily="34" charset="0"/>
+              </a:rPr>
+              <a:t> </a:t>
+            </a:r>
+            <a:r>
+              <a:rPr lang="en-US" dirty="0" err="1">
+                <a:latin typeface="Arial" panose="020B0604020202020204" pitchFamily="34" charset="0"/>
+                <a:cs typeface="Arial" panose="020B0604020202020204" pitchFamily="34" charset="0"/>
+              </a:rPr>
+              <a:t>hiển</a:t>
+            </a:r>
+            <a:r>
+              <a:rPr lang="en-US" dirty="0">
+                <a:latin typeface="Arial" panose="020B0604020202020204" pitchFamily="34" charset="0"/>
+                <a:cs typeface="Arial" panose="020B0604020202020204" pitchFamily="34" charset="0"/>
+              </a:rPr>
+              <a:t> </a:t>
+            </a:r>
+            <a:r>
+              <a:rPr lang="en-US" dirty="0" err="1">
+                <a:latin typeface="Arial" panose="020B0604020202020204" pitchFamily="34" charset="0"/>
+                <a:cs typeface="Arial" panose="020B0604020202020204" pitchFamily="34" charset="0"/>
+              </a:rPr>
+              <a:t>thị</a:t>
+            </a:r>
+            <a:r>
+              <a:rPr lang="en-US" dirty="0">
+                <a:latin typeface="Arial" panose="020B0604020202020204" pitchFamily="34" charset="0"/>
+                <a:cs typeface="Arial" panose="020B0604020202020204" pitchFamily="34" charset="0"/>
+              </a:rPr>
+              <a:t> </a:t>
+            </a:r>
+            <a:r>
+              <a:rPr lang="en-US" dirty="0" err="1">
+                <a:latin typeface="Arial" panose="020B0604020202020204" pitchFamily="34" charset="0"/>
+                <a:cs typeface="Arial" panose="020B0604020202020204" pitchFamily="34" charset="0"/>
+              </a:rPr>
+              <a:t>tốt</a:t>
+            </a:r>
+            <a:r>
+              <a:rPr lang="en-US" dirty="0">
+                <a:latin typeface="Arial" panose="020B0604020202020204" pitchFamily="34" charset="0"/>
+                <a:cs typeface="Arial" panose="020B0604020202020204" pitchFamily="34" charset="0"/>
+              </a:rPr>
+              <a:t> </a:t>
+            </a:r>
+            <a:r>
+              <a:rPr lang="en-US" dirty="0" err="1">
+                <a:latin typeface="Arial" panose="020B0604020202020204" pitchFamily="34" charset="0"/>
+                <a:cs typeface="Arial" panose="020B0604020202020204" pitchFamily="34" charset="0"/>
+              </a:rPr>
+              <a:t>trên</a:t>
+            </a:r>
+            <a:r>
+              <a:rPr lang="en-US" dirty="0">
+                <a:latin typeface="Arial" panose="020B0604020202020204" pitchFamily="34" charset="0"/>
+                <a:cs typeface="Arial" panose="020B0604020202020204" pitchFamily="34" charset="0"/>
+              </a:rPr>
+              <a:t> </a:t>
+            </a:r>
+            <a:r>
+              <a:rPr lang="en-US" dirty="0" err="1">
+                <a:latin typeface="Arial" panose="020B0604020202020204" pitchFamily="34" charset="0"/>
+                <a:cs typeface="Arial" panose="020B0604020202020204" pitchFamily="34" charset="0"/>
+              </a:rPr>
+              <a:t>hai</a:t>
+            </a:r>
+            <a:r>
+              <a:rPr lang="en-US" dirty="0">
+                <a:latin typeface="Arial" panose="020B0604020202020204" pitchFamily="34" charset="0"/>
+                <a:cs typeface="Arial" panose="020B0604020202020204" pitchFamily="34" charset="0"/>
+              </a:rPr>
+              <a:t> </a:t>
+            </a:r>
+            <a:r>
+              <a:rPr lang="en-US" dirty="0" err="1">
+                <a:latin typeface="Arial" panose="020B0604020202020204" pitchFamily="34" charset="0"/>
+                <a:cs typeface="Arial" panose="020B0604020202020204" pitchFamily="34" charset="0"/>
+              </a:rPr>
+              <a:t>thiết</a:t>
+            </a:r>
+            <a:r>
+              <a:rPr lang="en-US" dirty="0">
+                <a:latin typeface="Arial" panose="020B0604020202020204" pitchFamily="34" charset="0"/>
+                <a:cs typeface="Arial" panose="020B0604020202020204" pitchFamily="34" charset="0"/>
+              </a:rPr>
+              <a:t> </a:t>
+            </a:r>
+            <a:r>
+              <a:rPr lang="en-US" dirty="0" err="1">
+                <a:latin typeface="Arial" panose="020B0604020202020204" pitchFamily="34" charset="0"/>
+                <a:cs typeface="Arial" panose="020B0604020202020204" pitchFamily="34" charset="0"/>
+              </a:rPr>
+              <a:t>bị</a:t>
+            </a:r>
+            <a:r>
+              <a:rPr lang="en-US" dirty="0">
+                <a:latin typeface="Arial" panose="020B0604020202020204" pitchFamily="34" charset="0"/>
+                <a:cs typeface="Arial" panose="020B0604020202020204" pitchFamily="34" charset="0"/>
+              </a:rPr>
+              <a:t> </a:t>
+            </a:r>
+            <a:r>
+              <a:rPr lang="en-US" dirty="0" err="1">
+                <a:latin typeface="Arial" panose="020B0604020202020204" pitchFamily="34" charset="0"/>
+                <a:cs typeface="Arial" panose="020B0604020202020204" pitchFamily="34" charset="0"/>
+              </a:rPr>
+              <a:t>chính</a:t>
+            </a:r>
+            <a:r>
+              <a:rPr lang="en-US" dirty="0">
+                <a:latin typeface="Arial" panose="020B0604020202020204" pitchFamily="34" charset="0"/>
+                <a:cs typeface="Arial" panose="020B0604020202020204" pitchFamily="34" charset="0"/>
+              </a:rPr>
+              <a:t> </a:t>
+            </a:r>
+            <a:r>
+              <a:rPr lang="en-US" dirty="0" err="1">
+                <a:latin typeface="Arial" panose="020B0604020202020204" pitchFamily="34" charset="0"/>
+                <a:cs typeface="Arial" panose="020B0604020202020204" pitchFamily="34" charset="0"/>
+              </a:rPr>
+              <a:t>là</a:t>
+            </a:r>
+            <a:r>
+              <a:rPr lang="en-US" dirty="0">
+                <a:latin typeface="Arial" panose="020B0604020202020204" pitchFamily="34" charset="0"/>
+                <a:cs typeface="Arial" panose="020B0604020202020204" pitchFamily="34" charset="0"/>
+              </a:rPr>
+              <a:t> </a:t>
+            </a:r>
+            <a:r>
+              <a:rPr lang="en-US" dirty="0" err="1">
+                <a:latin typeface="Arial" panose="020B0604020202020204" pitchFamily="34" charset="0"/>
+                <a:cs typeface="Arial" panose="020B0604020202020204" pitchFamily="34" charset="0"/>
+              </a:rPr>
+              <a:t>máy</a:t>
+            </a:r>
+            <a:r>
+              <a:rPr lang="en-US" dirty="0">
+                <a:latin typeface="Arial" panose="020B0604020202020204" pitchFamily="34" charset="0"/>
+                <a:cs typeface="Arial" panose="020B0604020202020204" pitchFamily="34" charset="0"/>
+              </a:rPr>
+              <a:t> </a:t>
+            </a:r>
+            <a:r>
+              <a:rPr lang="en-US" dirty="0" err="1">
+                <a:latin typeface="Arial" panose="020B0604020202020204" pitchFamily="34" charset="0"/>
+                <a:cs typeface="Arial" panose="020B0604020202020204" pitchFamily="34" charset="0"/>
+              </a:rPr>
+              <a:t>tính</a:t>
+            </a:r>
+            <a:r>
+              <a:rPr lang="en-US" dirty="0">
+                <a:latin typeface="Arial" panose="020B0604020202020204" pitchFamily="34" charset="0"/>
+                <a:cs typeface="Arial" panose="020B0604020202020204" pitchFamily="34" charset="0"/>
+              </a:rPr>
+              <a:t> </a:t>
+            </a:r>
+            <a:r>
+              <a:rPr lang="en-US" dirty="0" err="1">
+                <a:latin typeface="Arial" panose="020B0604020202020204" pitchFamily="34" charset="0"/>
+                <a:cs typeface="Arial" panose="020B0604020202020204" pitchFamily="34" charset="0"/>
+              </a:rPr>
+              <a:t>và</a:t>
+            </a:r>
+            <a:r>
+              <a:rPr lang="en-US" dirty="0">
+                <a:latin typeface="Arial" panose="020B0604020202020204" pitchFamily="34" charset="0"/>
+                <a:cs typeface="Arial" panose="020B0604020202020204" pitchFamily="34" charset="0"/>
+              </a:rPr>
+              <a:t> mobile</a:t>
+            </a:r>
+          </a:p>
+          <a:p>
+            <a:pPr marL="285750" indent="-285750">
+              <a:buFont typeface="Arial" panose="020B0604020202020204" pitchFamily="34" charset="0"/>
+              <a:buChar char="•"/>
+            </a:pPr>
+            <a:endParaRPr lang="en-US" dirty="0">
+              <a:latin typeface="Arial" panose="020B0604020202020204" pitchFamily="34" charset="0"/>
+              <a:cs typeface="Arial" panose="020B0604020202020204" pitchFamily="34" charset="0"/>
+            </a:endParaRPr>
+          </a:p>
+          <a:p>
+            <a:pPr marL="285750" indent="-285750">
+              <a:buFont typeface="Arial" panose="020B0604020202020204" pitchFamily="34" charset="0"/>
+              <a:buChar char="•"/>
+            </a:pPr>
+            <a:endParaRPr lang="en-US" dirty="0">
+              <a:latin typeface="Arial" panose="020B0604020202020204" pitchFamily="34" charset="0"/>
+              <a:cs typeface="Arial" panose="020B0604020202020204" pitchFamily="34" charset="0"/>
+            </a:endParaRPr>
           </a:p>
         </p:txBody>
       </p:sp>

</xml_diff>